<commit_message>
adding system model in seminar presentation
</commit_message>
<xml_diff>
--- a/Seminar.pptx
+++ b/Seminar.pptx
@@ -19,10 +19,12 @@
     <p:sldId id="270" r:id="rId13"/>
     <p:sldId id="267" r:id="rId14"/>
     <p:sldId id="269" r:id="rId15"/>
-    <p:sldId id="271" r:id="rId16"/>
-    <p:sldId id="272" r:id="rId17"/>
-    <p:sldId id="273" r:id="rId18"/>
-    <p:sldId id="274" r:id="rId19"/>
+    <p:sldId id="275" r:id="rId16"/>
+    <p:sldId id="276" r:id="rId17"/>
+    <p:sldId id="271" r:id="rId18"/>
+    <p:sldId id="272" r:id="rId19"/>
+    <p:sldId id="273" r:id="rId20"/>
+    <p:sldId id="274" r:id="rId21"/>
   </p:sldIdLst>
   <p:sldSz cx="12192000" cy="6858000"/>
   <p:notesSz cx="6858000" cy="9144000"/>
@@ -121,6 +123,11 @@
       </a:defRPr>
     </a:lvl9pPr>
   </p:defaultTextStyle>
+  <p:extLst>
+    <p:ext uri="{EFAFB233-063F-42B5-8137-9DF3F51BA10A}">
+      <p15:sldGuideLst xmlns:p15="http://schemas.microsoft.com/office/powerpoint/2012/main"/>
+    </p:ext>
+  </p:extLst>
 </p:presentation>
 </file>
 
@@ -1209,426 +1216,6 @@
       <dsp:cNvGrpSpPr/>
     </dsp:nvGrpSpPr>
     <dsp:grpSpPr/>
-    <dsp:sp modelId="{5367BEB7-C8D2-487B-9C5F-C72E001930B9}">
-      <dsp:nvSpPr>
-        <dsp:cNvPr id="0" name=""/>
-        <dsp:cNvSpPr/>
-      </dsp:nvSpPr>
-      <dsp:spPr>
-        <a:xfrm>
-          <a:off x="742949" y="0"/>
-          <a:ext cx="8420100" cy="3541712"/>
-        </a:xfrm>
-        <a:prstGeom prst="rightArrow">
-          <a:avLst/>
-        </a:prstGeom>
-        <a:solidFill>
-          <a:schemeClr val="accent1">
-            <a:tint val="40000"/>
-            <a:hueOff val="0"/>
-            <a:satOff val="0"/>
-            <a:lumOff val="0"/>
-            <a:alphaOff val="0"/>
-          </a:schemeClr>
-        </a:solidFill>
-        <a:ln>
-          <a:noFill/>
-        </a:ln>
-        <a:effectLst/>
-      </dsp:spPr>
-      <dsp:style>
-        <a:lnRef idx="0">
-          <a:scrgbClr r="0" g="0" b="0"/>
-        </a:lnRef>
-        <a:fillRef idx="1">
-          <a:scrgbClr r="0" g="0" b="0"/>
-        </a:fillRef>
-        <a:effectRef idx="0">
-          <a:scrgbClr r="0" g="0" b="0"/>
-        </a:effectRef>
-        <a:fontRef idx="minor"/>
-      </dsp:style>
-    </dsp:sp>
-    <dsp:sp modelId="{BE74F7FF-1CF1-4526-916F-DC7E70A27C57}">
-      <dsp:nvSpPr>
-        <dsp:cNvPr id="0" name=""/>
-        <dsp:cNvSpPr/>
-      </dsp:nvSpPr>
-      <dsp:spPr>
-        <a:xfrm>
-          <a:off x="4353" y="1062513"/>
-          <a:ext cx="1903325" cy="1416684"/>
-        </a:xfrm>
-        <a:prstGeom prst="roundRect">
-          <a:avLst/>
-        </a:prstGeom>
-        <a:solidFill>
-          <a:schemeClr val="accent1">
-            <a:hueOff val="0"/>
-            <a:satOff val="0"/>
-            <a:lumOff val="0"/>
-            <a:alphaOff val="0"/>
-          </a:schemeClr>
-        </a:solidFill>
-        <a:ln w="15875" cap="flat" cmpd="sng" algn="ctr">
-          <a:solidFill>
-            <a:schemeClr val="lt1">
-              <a:hueOff val="0"/>
-              <a:satOff val="0"/>
-              <a:lumOff val="0"/>
-              <a:alphaOff val="0"/>
-            </a:schemeClr>
-          </a:solidFill>
-          <a:prstDash val="solid"/>
-        </a:ln>
-        <a:effectLst/>
-      </dsp:spPr>
-      <dsp:style>
-        <a:lnRef idx="2">
-          <a:scrgbClr r="0" g="0" b="0"/>
-        </a:lnRef>
-        <a:fillRef idx="1">
-          <a:scrgbClr r="0" g="0" b="0"/>
-        </a:fillRef>
-        <a:effectRef idx="0">
-          <a:scrgbClr r="0" g="0" b="0"/>
-        </a:effectRef>
-        <a:fontRef idx="minor">
-          <a:schemeClr val="lt1"/>
-        </a:fontRef>
-      </dsp:style>
-      <dsp:txBody>
-        <a:bodyPr spcFirstLastPara="0" vert="horz" wrap="square" lIns="64770" tIns="64770" rIns="64770" bIns="64770" numCol="1" spcCol="1270" anchor="ctr" anchorCtr="0">
-          <a:noAutofit/>
-        </a:bodyPr>
-        <a:lstStyle/>
-        <a:p>
-          <a:pPr lvl="0" algn="ctr" defTabSz="755650">
-            <a:lnSpc>
-              <a:spcPct val="90000"/>
-            </a:lnSpc>
-            <a:spcBef>
-              <a:spcPct val="0"/>
-            </a:spcBef>
-            <a:spcAft>
-              <a:spcPct val="35000"/>
-            </a:spcAft>
-          </a:pPr>
-          <a:r>
-            <a:rPr lang="id-ID" sz="1700" kern="1200"/>
-            <a:t>mengambil gambar background</a:t>
-          </a:r>
-        </a:p>
-      </dsp:txBody>
-      <dsp:txXfrm>
-        <a:off x="73510" y="1131670"/>
-        <a:ext cx="1765011" cy="1278370"/>
-      </dsp:txXfrm>
-    </dsp:sp>
-    <dsp:sp modelId="{D7D6BA0D-98B4-4FA7-AF21-1A5E916A404B}">
-      <dsp:nvSpPr>
-        <dsp:cNvPr id="0" name=""/>
-        <dsp:cNvSpPr/>
-      </dsp:nvSpPr>
-      <dsp:spPr>
-        <a:xfrm>
-          <a:off x="2002845" y="1062513"/>
-          <a:ext cx="1903325" cy="1416684"/>
-        </a:xfrm>
-        <a:prstGeom prst="roundRect">
-          <a:avLst/>
-        </a:prstGeom>
-        <a:solidFill>
-          <a:schemeClr val="accent1">
-            <a:hueOff val="0"/>
-            <a:satOff val="0"/>
-            <a:lumOff val="0"/>
-            <a:alphaOff val="0"/>
-          </a:schemeClr>
-        </a:solidFill>
-        <a:ln w="15875" cap="flat" cmpd="sng" algn="ctr">
-          <a:solidFill>
-            <a:schemeClr val="lt1">
-              <a:hueOff val="0"/>
-              <a:satOff val="0"/>
-              <a:lumOff val="0"/>
-              <a:alphaOff val="0"/>
-            </a:schemeClr>
-          </a:solidFill>
-          <a:prstDash val="solid"/>
-        </a:ln>
-        <a:effectLst/>
-      </dsp:spPr>
-      <dsp:style>
-        <a:lnRef idx="2">
-          <a:scrgbClr r="0" g="0" b="0"/>
-        </a:lnRef>
-        <a:fillRef idx="1">
-          <a:scrgbClr r="0" g="0" b="0"/>
-        </a:fillRef>
-        <a:effectRef idx="0">
-          <a:scrgbClr r="0" g="0" b="0"/>
-        </a:effectRef>
-        <a:fontRef idx="minor">
-          <a:schemeClr val="lt1"/>
-        </a:fontRef>
-      </dsp:style>
-      <dsp:txBody>
-        <a:bodyPr spcFirstLastPara="0" vert="horz" wrap="square" lIns="64770" tIns="64770" rIns="64770" bIns="64770" numCol="1" spcCol="1270" anchor="ctr" anchorCtr="0">
-          <a:noAutofit/>
-        </a:bodyPr>
-        <a:lstStyle/>
-        <a:p>
-          <a:pPr lvl="0" algn="ctr" defTabSz="755650">
-            <a:lnSpc>
-              <a:spcPct val="90000"/>
-            </a:lnSpc>
-            <a:spcBef>
-              <a:spcPct val="0"/>
-            </a:spcBef>
-            <a:spcAft>
-              <a:spcPct val="35000"/>
-            </a:spcAft>
-          </a:pPr>
-          <a:r>
-            <a:rPr lang="id-ID" sz="1700" kern="1200"/>
-            <a:t>mengambil gambar obyek yang bergerak di atas background</a:t>
-          </a:r>
-        </a:p>
-      </dsp:txBody>
-      <dsp:txXfrm>
-        <a:off x="2072002" y="1131670"/>
-        <a:ext cx="1765011" cy="1278370"/>
-      </dsp:txXfrm>
-    </dsp:sp>
-    <dsp:sp modelId="{32FD0A88-0E2A-490E-8C61-BC5204CCDE79}">
-      <dsp:nvSpPr>
-        <dsp:cNvPr id="0" name=""/>
-        <dsp:cNvSpPr/>
-      </dsp:nvSpPr>
-      <dsp:spPr>
-        <a:xfrm>
-          <a:off x="4001337" y="1062513"/>
-          <a:ext cx="1903325" cy="1416684"/>
-        </a:xfrm>
-        <a:prstGeom prst="roundRect">
-          <a:avLst/>
-        </a:prstGeom>
-        <a:solidFill>
-          <a:schemeClr val="accent1">
-            <a:hueOff val="0"/>
-            <a:satOff val="0"/>
-            <a:lumOff val="0"/>
-            <a:alphaOff val="0"/>
-          </a:schemeClr>
-        </a:solidFill>
-        <a:ln w="15875" cap="flat" cmpd="sng" algn="ctr">
-          <a:solidFill>
-            <a:schemeClr val="lt1">
-              <a:hueOff val="0"/>
-              <a:satOff val="0"/>
-              <a:lumOff val="0"/>
-              <a:alphaOff val="0"/>
-            </a:schemeClr>
-          </a:solidFill>
-          <a:prstDash val="solid"/>
-        </a:ln>
-        <a:effectLst/>
-      </dsp:spPr>
-      <dsp:style>
-        <a:lnRef idx="2">
-          <a:scrgbClr r="0" g="0" b="0"/>
-        </a:lnRef>
-        <a:fillRef idx="1">
-          <a:scrgbClr r="0" g="0" b="0"/>
-        </a:fillRef>
-        <a:effectRef idx="0">
-          <a:scrgbClr r="0" g="0" b="0"/>
-        </a:effectRef>
-        <a:fontRef idx="minor">
-          <a:schemeClr val="lt1"/>
-        </a:fontRef>
-      </dsp:style>
-      <dsp:txBody>
-        <a:bodyPr spcFirstLastPara="0" vert="horz" wrap="square" lIns="64770" tIns="64770" rIns="64770" bIns="64770" numCol="1" spcCol="1270" anchor="ctr" anchorCtr="0">
-          <a:noAutofit/>
-        </a:bodyPr>
-        <a:lstStyle/>
-        <a:p>
-          <a:pPr lvl="0" algn="ctr" defTabSz="755650">
-            <a:lnSpc>
-              <a:spcPct val="90000"/>
-            </a:lnSpc>
-            <a:spcBef>
-              <a:spcPct val="0"/>
-            </a:spcBef>
-            <a:spcAft>
-              <a:spcPct val="35000"/>
-            </a:spcAft>
-          </a:pPr>
-          <a:r>
-            <a:rPr lang="id-ID" sz="1700" kern="1200"/>
-            <a:t>membuang background</a:t>
-          </a:r>
-        </a:p>
-      </dsp:txBody>
-      <dsp:txXfrm>
-        <a:off x="4070494" y="1131670"/>
-        <a:ext cx="1765011" cy="1278370"/>
-      </dsp:txXfrm>
-    </dsp:sp>
-    <dsp:sp modelId="{A0192B97-C475-4C89-B5E4-DE26328DB010}">
-      <dsp:nvSpPr>
-        <dsp:cNvPr id="0" name=""/>
-        <dsp:cNvSpPr/>
-      </dsp:nvSpPr>
-      <dsp:spPr>
-        <a:xfrm>
-          <a:off x="5999829" y="1062513"/>
-          <a:ext cx="1903325" cy="1416684"/>
-        </a:xfrm>
-        <a:prstGeom prst="roundRect">
-          <a:avLst/>
-        </a:prstGeom>
-        <a:solidFill>
-          <a:schemeClr val="accent1">
-            <a:hueOff val="0"/>
-            <a:satOff val="0"/>
-            <a:lumOff val="0"/>
-            <a:alphaOff val="0"/>
-          </a:schemeClr>
-        </a:solidFill>
-        <a:ln w="15875" cap="flat" cmpd="sng" algn="ctr">
-          <a:solidFill>
-            <a:schemeClr val="lt1">
-              <a:hueOff val="0"/>
-              <a:satOff val="0"/>
-              <a:lumOff val="0"/>
-              <a:alphaOff val="0"/>
-            </a:schemeClr>
-          </a:solidFill>
-          <a:prstDash val="solid"/>
-        </a:ln>
-        <a:effectLst/>
-      </dsp:spPr>
-      <dsp:style>
-        <a:lnRef idx="2">
-          <a:scrgbClr r="0" g="0" b="0"/>
-        </a:lnRef>
-        <a:fillRef idx="1">
-          <a:scrgbClr r="0" g="0" b="0"/>
-        </a:fillRef>
-        <a:effectRef idx="0">
-          <a:scrgbClr r="0" g="0" b="0"/>
-        </a:effectRef>
-        <a:fontRef idx="minor">
-          <a:schemeClr val="lt1"/>
-        </a:fontRef>
-      </dsp:style>
-      <dsp:txBody>
-        <a:bodyPr spcFirstLastPara="0" vert="horz" wrap="square" lIns="64770" tIns="64770" rIns="64770" bIns="64770" numCol="1" spcCol="1270" anchor="ctr" anchorCtr="0">
-          <a:noAutofit/>
-        </a:bodyPr>
-        <a:lstStyle/>
-        <a:p>
-          <a:pPr lvl="0" algn="ctr" defTabSz="755650">
-            <a:lnSpc>
-              <a:spcPct val="90000"/>
-            </a:lnSpc>
-            <a:spcBef>
-              <a:spcPct val="0"/>
-            </a:spcBef>
-            <a:spcAft>
-              <a:spcPct val="35000"/>
-            </a:spcAft>
-          </a:pPr>
-          <a:r>
-            <a:rPr lang="id-ID" sz="1700" kern="1200"/>
-            <a:t>membuang obyek tak bergerak</a:t>
-          </a:r>
-        </a:p>
-      </dsp:txBody>
-      <dsp:txXfrm>
-        <a:off x="6068986" y="1131670"/>
-        <a:ext cx="1765011" cy="1278370"/>
-      </dsp:txXfrm>
-    </dsp:sp>
-    <dsp:sp modelId="{268BC920-BF59-455F-8B7A-3E9A3CDC2823}">
-      <dsp:nvSpPr>
-        <dsp:cNvPr id="0" name=""/>
-        <dsp:cNvSpPr/>
-      </dsp:nvSpPr>
-      <dsp:spPr>
-        <a:xfrm>
-          <a:off x="7998321" y="1062513"/>
-          <a:ext cx="1903325" cy="1416684"/>
-        </a:xfrm>
-        <a:prstGeom prst="roundRect">
-          <a:avLst/>
-        </a:prstGeom>
-        <a:solidFill>
-          <a:schemeClr val="accent1">
-            <a:hueOff val="0"/>
-            <a:satOff val="0"/>
-            <a:lumOff val="0"/>
-            <a:alphaOff val="0"/>
-          </a:schemeClr>
-        </a:solidFill>
-        <a:ln w="15875" cap="flat" cmpd="sng" algn="ctr">
-          <a:solidFill>
-            <a:schemeClr val="lt1">
-              <a:hueOff val="0"/>
-              <a:satOff val="0"/>
-              <a:lumOff val="0"/>
-              <a:alphaOff val="0"/>
-            </a:schemeClr>
-          </a:solidFill>
-          <a:prstDash val="solid"/>
-        </a:ln>
-        <a:effectLst/>
-      </dsp:spPr>
-      <dsp:style>
-        <a:lnRef idx="2">
-          <a:scrgbClr r="0" g="0" b="0"/>
-        </a:lnRef>
-        <a:fillRef idx="1">
-          <a:scrgbClr r="0" g="0" b="0"/>
-        </a:fillRef>
-        <a:effectRef idx="0">
-          <a:scrgbClr r="0" g="0" b="0"/>
-        </a:effectRef>
-        <a:fontRef idx="minor">
-          <a:schemeClr val="lt1"/>
-        </a:fontRef>
-      </dsp:style>
-      <dsp:txBody>
-        <a:bodyPr spcFirstLastPara="0" vert="horz" wrap="square" lIns="64770" tIns="64770" rIns="64770" bIns="64770" numCol="1" spcCol="1270" anchor="ctr" anchorCtr="0">
-          <a:noAutofit/>
-        </a:bodyPr>
-        <a:lstStyle/>
-        <a:p>
-          <a:pPr lvl="0" algn="ctr" defTabSz="755650">
-            <a:lnSpc>
-              <a:spcPct val="90000"/>
-            </a:lnSpc>
-            <a:spcBef>
-              <a:spcPct val="0"/>
-            </a:spcBef>
-            <a:spcAft>
-              <a:spcPct val="35000"/>
-            </a:spcAft>
-          </a:pPr>
-          <a:r>
-            <a:rPr lang="id-ID" sz="1700" kern="1200"/>
-            <a:t>melakukan thresholding warna putih pada obyek akhir yang terdeteksi</a:t>
-          </a:r>
-        </a:p>
-      </dsp:txBody>
-      <dsp:txXfrm>
-        <a:off x="8067478" y="1131670"/>
-        <a:ext cx="1765011" cy="1278370"/>
-      </dsp:txXfrm>
-    </dsp:sp>
   </dsp:spTree>
 </dsp:drawing>
 </file>
@@ -2878,7 +2465,7 @@
           <a:noFill/>
           <a:extLst>
             <a:ext uri="{909E8E84-426E-40dd-AFC4-6F175D3DCCD1}">
-              <a14:hiddenFill xmlns:a14="http://schemas.microsoft.com/office/drawing/2010/main" xmlns="">
+              <a14:hiddenFill xmlns="" xmlns:a14="http://schemas.microsoft.com/office/drawing/2010/main">
                 <a:solidFill>
                   <a:srgbClr val="FFFFFF"/>
                 </a:solidFill>
@@ -2937,7 +2524,7 @@
             </a:ln>
             <a:extLst>
               <a:ext uri="{91240B29-F687-4f45-9708-019B960494DF}">
-                <a14:hiddenLine xmlns:a14="http://schemas.microsoft.com/office/drawing/2010/main" xmlns="" w="9525">
+                <a14:hiddenLine xmlns="" xmlns:a14="http://schemas.microsoft.com/office/drawing/2010/main" w="9525">
                   <a:solidFill>
                     <a:srgbClr val="000000"/>
                   </a:solidFill>
@@ -3027,7 +2614,7 @@
             </a:ln>
             <a:extLst>
               <a:ext uri="{91240B29-F687-4f45-9708-019B960494DF}">
-                <a14:hiddenLine xmlns:a14="http://schemas.microsoft.com/office/drawing/2010/main" xmlns="" w="9525">
+                <a14:hiddenLine xmlns="" xmlns:a14="http://schemas.microsoft.com/office/drawing/2010/main" w="9525">
                   <a:solidFill>
                     <a:srgbClr val="000000"/>
                   </a:solidFill>
@@ -3117,7 +2704,7 @@
             </a:ln>
             <a:extLst>
               <a:ext uri="{91240B29-F687-4f45-9708-019B960494DF}">
-                <a14:hiddenLine xmlns:a14="http://schemas.microsoft.com/office/drawing/2010/main" xmlns="" w="9525">
+                <a14:hiddenLine xmlns="" xmlns:a14="http://schemas.microsoft.com/office/drawing/2010/main" w="9525">
                   <a:solidFill>
                     <a:srgbClr val="000000"/>
                   </a:solidFill>
@@ -3151,7 +2738,7 @@
             </a:ln>
             <a:extLst>
               <a:ext uri="{91240B29-F687-4f45-9708-019B960494DF}">
-                <a14:hiddenLine xmlns:a14="http://schemas.microsoft.com/office/drawing/2010/main" xmlns="" w="9525">
+                <a14:hiddenLine xmlns="" xmlns:a14="http://schemas.microsoft.com/office/drawing/2010/main" w="9525">
                   <a:solidFill>
                     <a:srgbClr val="000000"/>
                   </a:solidFill>
@@ -3241,7 +2828,7 @@
             </a:ln>
             <a:extLst>
               <a:ext uri="{91240B29-F687-4f45-9708-019B960494DF}">
-                <a14:hiddenLine xmlns:a14="http://schemas.microsoft.com/office/drawing/2010/main" xmlns="" w="9525">
+                <a14:hiddenLine xmlns="" xmlns:a14="http://schemas.microsoft.com/office/drawing/2010/main" w="9525">
                   <a:solidFill>
                     <a:srgbClr val="000000"/>
                   </a:solidFill>
@@ -3303,7 +2890,7 @@
             </a:ln>
             <a:extLst>
               <a:ext uri="{91240B29-F687-4f45-9708-019B960494DF}">
-                <a14:hiddenLine xmlns:a14="http://schemas.microsoft.com/office/drawing/2010/main" xmlns="" w="9525">
+                <a14:hiddenLine xmlns="" xmlns:a14="http://schemas.microsoft.com/office/drawing/2010/main" w="9525">
                   <a:solidFill>
                     <a:srgbClr val="000000"/>
                   </a:solidFill>
@@ -3365,7 +2952,7 @@
             </a:ln>
             <a:extLst>
               <a:ext uri="{91240B29-F687-4f45-9708-019B960494DF}">
-                <a14:hiddenLine xmlns:a14="http://schemas.microsoft.com/office/drawing/2010/main" xmlns="" w="9525">
+                <a14:hiddenLine xmlns="" xmlns:a14="http://schemas.microsoft.com/office/drawing/2010/main" w="9525">
                   <a:solidFill>
                     <a:srgbClr val="000000"/>
                   </a:solidFill>
@@ -3455,7 +3042,7 @@
             </a:ln>
             <a:extLst>
               <a:ext uri="{91240B29-F687-4f45-9708-019B960494DF}">
-                <a14:hiddenLine xmlns:a14="http://schemas.microsoft.com/office/drawing/2010/main" xmlns="" w="9525">
+                <a14:hiddenLine xmlns="" xmlns:a14="http://schemas.microsoft.com/office/drawing/2010/main" w="9525">
                   <a:solidFill>
                     <a:srgbClr val="000000"/>
                   </a:solidFill>
@@ -3517,7 +3104,7 @@
             </a:ln>
             <a:extLst>
               <a:ext uri="{91240B29-F687-4f45-9708-019B960494DF}">
-                <a14:hiddenLine xmlns:a14="http://schemas.microsoft.com/office/drawing/2010/main" xmlns="" w="9525">
+                <a14:hiddenLine xmlns="" xmlns:a14="http://schemas.microsoft.com/office/drawing/2010/main" w="9525">
                   <a:solidFill>
                     <a:srgbClr val="000000"/>
                   </a:solidFill>
@@ -3579,7 +3166,7 @@
             </a:ln>
             <a:extLst>
               <a:ext uri="{91240B29-F687-4f45-9708-019B960494DF}">
-                <a14:hiddenLine xmlns:a14="http://schemas.microsoft.com/office/drawing/2010/main" xmlns="" w="9525">
+                <a14:hiddenLine xmlns="" xmlns:a14="http://schemas.microsoft.com/office/drawing/2010/main" w="9525">
                   <a:solidFill>
                     <a:srgbClr val="000000"/>
                   </a:solidFill>
@@ -3669,7 +3256,7 @@
             </a:ln>
             <a:extLst>
               <a:ext uri="{91240B29-F687-4f45-9708-019B960494DF}">
-                <a14:hiddenLine xmlns:a14="http://schemas.microsoft.com/office/drawing/2010/main" xmlns="" w="9525">
+                <a14:hiddenLine xmlns="" xmlns:a14="http://schemas.microsoft.com/office/drawing/2010/main" w="9525">
                   <a:solidFill>
                     <a:srgbClr val="000000"/>
                   </a:solidFill>
@@ -3759,7 +3346,7 @@
             </a:ln>
             <a:extLst>
               <a:ext uri="{91240B29-F687-4f45-9708-019B960494DF}">
-                <a14:hiddenLine xmlns:a14="http://schemas.microsoft.com/office/drawing/2010/main" xmlns="" w="9525">
+                <a14:hiddenLine xmlns="" xmlns:a14="http://schemas.microsoft.com/office/drawing/2010/main" w="9525">
                   <a:solidFill>
                     <a:srgbClr val="000000"/>
                   </a:solidFill>
@@ -3821,7 +3408,7 @@
             </a:ln>
             <a:extLst>
               <a:ext uri="{91240B29-F687-4f45-9708-019B960494DF}">
-                <a14:hiddenLine xmlns:a14="http://schemas.microsoft.com/office/drawing/2010/main" xmlns="" w="9525">
+                <a14:hiddenLine xmlns="" xmlns:a14="http://schemas.microsoft.com/office/drawing/2010/main" w="9525">
                   <a:solidFill>
                     <a:srgbClr val="000000"/>
                   </a:solidFill>
@@ -3931,7 +3518,7 @@
             </a:ln>
             <a:extLst>
               <a:ext uri="{91240B29-F687-4f45-9708-019B960494DF}">
-                <a14:hiddenLine xmlns:a14="http://schemas.microsoft.com/office/drawing/2010/main" xmlns="" w="9525">
+                <a14:hiddenLine xmlns="" xmlns:a14="http://schemas.microsoft.com/office/drawing/2010/main" w="9525">
                   <a:solidFill>
                     <a:srgbClr val="000000"/>
                   </a:solidFill>
@@ -3993,7 +3580,7 @@
             </a:ln>
             <a:extLst>
               <a:ext uri="{91240B29-F687-4f45-9708-019B960494DF}">
-                <a14:hiddenLine xmlns:a14="http://schemas.microsoft.com/office/drawing/2010/main" xmlns="" w="9525">
+                <a14:hiddenLine xmlns="" xmlns:a14="http://schemas.microsoft.com/office/drawing/2010/main" w="9525">
                   <a:solidFill>
                     <a:srgbClr val="000000"/>
                   </a:solidFill>
@@ -4083,7 +3670,7 @@
             </a:ln>
             <a:extLst>
               <a:ext uri="{91240B29-F687-4f45-9708-019B960494DF}">
-                <a14:hiddenLine xmlns:a14="http://schemas.microsoft.com/office/drawing/2010/main" xmlns="" w="9525">
+                <a14:hiddenLine xmlns="" xmlns:a14="http://schemas.microsoft.com/office/drawing/2010/main" w="9525">
                   <a:solidFill>
                     <a:srgbClr val="000000"/>
                   </a:solidFill>
@@ -4173,7 +3760,7 @@
             </a:ln>
             <a:extLst>
               <a:ext uri="{91240B29-F687-4f45-9708-019B960494DF}">
-                <a14:hiddenLine xmlns:a14="http://schemas.microsoft.com/office/drawing/2010/main" xmlns="" w="9525">
+                <a14:hiddenLine xmlns="" xmlns:a14="http://schemas.microsoft.com/office/drawing/2010/main" w="9525">
                   <a:solidFill>
                     <a:srgbClr val="000000"/>
                   </a:solidFill>
@@ -4235,7 +3822,7 @@
             </a:ln>
             <a:extLst>
               <a:ext uri="{91240B29-F687-4f45-9708-019B960494DF}">
-                <a14:hiddenLine xmlns:a14="http://schemas.microsoft.com/office/drawing/2010/main" xmlns="" w="9525">
+                <a14:hiddenLine xmlns="" xmlns:a14="http://schemas.microsoft.com/office/drawing/2010/main" w="9525">
                   <a:solidFill>
                     <a:srgbClr val="000000"/>
                   </a:solidFill>
@@ -4325,7 +3912,7 @@
             </a:ln>
             <a:extLst>
               <a:ext uri="{91240B29-F687-4f45-9708-019B960494DF}">
-                <a14:hiddenLine xmlns:a14="http://schemas.microsoft.com/office/drawing/2010/main" xmlns="" w="9525">
+                <a14:hiddenLine xmlns="" xmlns:a14="http://schemas.microsoft.com/office/drawing/2010/main" w="9525">
                   <a:solidFill>
                     <a:srgbClr val="000000"/>
                   </a:solidFill>
@@ -4415,7 +4002,7 @@
             </a:ln>
             <a:extLst>
               <a:ext uri="{91240B29-F687-4f45-9708-019B960494DF}">
-                <a14:hiddenLine xmlns:a14="http://schemas.microsoft.com/office/drawing/2010/main" xmlns="" w="9525">
+                <a14:hiddenLine xmlns="" xmlns:a14="http://schemas.microsoft.com/office/drawing/2010/main" w="9525">
                   <a:solidFill>
                     <a:srgbClr val="000000"/>
                   </a:solidFill>
@@ -4471,7 +4058,7 @@
             </a:ln>
             <a:extLst>
               <a:ext uri="{91240B29-F687-4f45-9708-019B960494DF}">
-                <a14:hiddenLine xmlns:a14="http://schemas.microsoft.com/office/drawing/2010/main" xmlns="" w="9525">
+                <a14:hiddenLine xmlns="" xmlns:a14="http://schemas.microsoft.com/office/drawing/2010/main" w="9525">
                   <a:solidFill>
                     <a:srgbClr val="000000"/>
                   </a:solidFill>
@@ -4561,7 +4148,7 @@
             </a:ln>
             <a:extLst>
               <a:ext uri="{91240B29-F687-4f45-9708-019B960494DF}">
-                <a14:hiddenLine xmlns:a14="http://schemas.microsoft.com/office/drawing/2010/main" xmlns="" w="9525">
+                <a14:hiddenLine xmlns="" xmlns:a14="http://schemas.microsoft.com/office/drawing/2010/main" w="9525">
                   <a:solidFill>
                     <a:srgbClr val="000000"/>
                   </a:solidFill>
@@ -4617,7 +4204,7 @@
             </a:ln>
             <a:extLst>
               <a:ext uri="{91240B29-F687-4f45-9708-019B960494DF}">
-                <a14:hiddenLine xmlns:a14="http://schemas.microsoft.com/office/drawing/2010/main" xmlns="" w="9525">
+                <a14:hiddenLine xmlns="" xmlns:a14="http://schemas.microsoft.com/office/drawing/2010/main" w="9525">
                   <a:solidFill>
                     <a:srgbClr val="000000"/>
                   </a:solidFill>
@@ -4707,7 +4294,7 @@
             </a:ln>
             <a:extLst>
               <a:ext uri="{91240B29-F687-4f45-9708-019B960494DF}">
-                <a14:hiddenLine xmlns:a14="http://schemas.microsoft.com/office/drawing/2010/main" xmlns="" w="9525">
+                <a14:hiddenLine xmlns="" xmlns:a14="http://schemas.microsoft.com/office/drawing/2010/main" w="9525">
                   <a:solidFill>
                     <a:srgbClr val="000000"/>
                   </a:solidFill>
@@ -4775,7 +4362,7 @@
             </a:ln>
             <a:extLst>
               <a:ext uri="{91240B29-F687-4f45-9708-019B960494DF}">
-                <a14:hiddenLine xmlns:a14="http://schemas.microsoft.com/office/drawing/2010/main" xmlns="" w="9525">
+                <a14:hiddenLine xmlns="" xmlns:a14="http://schemas.microsoft.com/office/drawing/2010/main" w="9525">
                   <a:solidFill>
                     <a:srgbClr val="000000"/>
                   </a:solidFill>
@@ -4865,7 +4452,7 @@
             </a:ln>
             <a:extLst>
               <a:ext uri="{91240B29-F687-4f45-9708-019B960494DF}">
-                <a14:hiddenLine xmlns:a14="http://schemas.microsoft.com/office/drawing/2010/main" xmlns="" w="9525">
+                <a14:hiddenLine xmlns="" xmlns:a14="http://schemas.microsoft.com/office/drawing/2010/main" w="9525">
                   <a:solidFill>
                     <a:srgbClr val="000000"/>
                   </a:solidFill>
@@ -4933,7 +4520,7 @@
             </a:ln>
             <a:extLst>
               <a:ext uri="{91240B29-F687-4f45-9708-019B960494DF}">
-                <a14:hiddenLine xmlns:a14="http://schemas.microsoft.com/office/drawing/2010/main" xmlns="" w="9525">
+                <a14:hiddenLine xmlns="" xmlns:a14="http://schemas.microsoft.com/office/drawing/2010/main" w="9525">
                   <a:solidFill>
                     <a:srgbClr val="000000"/>
                   </a:solidFill>
@@ -5023,7 +4610,7 @@
             </a:ln>
             <a:extLst>
               <a:ext uri="{91240B29-F687-4f45-9708-019B960494DF}">
-                <a14:hiddenLine xmlns:a14="http://schemas.microsoft.com/office/drawing/2010/main" xmlns="" w="9525">
+                <a14:hiddenLine xmlns="" xmlns:a14="http://schemas.microsoft.com/office/drawing/2010/main" w="9525">
                   <a:solidFill>
                     <a:srgbClr val="000000"/>
                   </a:solidFill>
@@ -5057,7 +4644,7 @@
             </a:ln>
             <a:extLst>
               <a:ext uri="{91240B29-F687-4f45-9708-019B960494DF}">
-                <a14:hiddenLine xmlns:a14="http://schemas.microsoft.com/office/drawing/2010/main" xmlns="" w="9525">
+                <a14:hiddenLine xmlns="" xmlns:a14="http://schemas.microsoft.com/office/drawing/2010/main" w="9525">
                   <a:solidFill>
                     <a:srgbClr val="000000"/>
                   </a:solidFill>
@@ -5147,7 +4734,7 @@
             </a:ln>
             <a:extLst>
               <a:ext uri="{91240B29-F687-4f45-9708-019B960494DF}">
-                <a14:hiddenLine xmlns:a14="http://schemas.microsoft.com/office/drawing/2010/main" xmlns="" w="9525">
+                <a14:hiddenLine xmlns="" xmlns:a14="http://schemas.microsoft.com/office/drawing/2010/main" w="9525">
                   <a:solidFill>
                     <a:srgbClr val="000000"/>
                   </a:solidFill>
@@ -5209,7 +4796,7 @@
             </a:ln>
             <a:extLst>
               <a:ext uri="{91240B29-F687-4f45-9708-019B960494DF}">
-                <a14:hiddenLine xmlns:a14="http://schemas.microsoft.com/office/drawing/2010/main" xmlns="" w="9525">
+                <a14:hiddenLine xmlns="" xmlns:a14="http://schemas.microsoft.com/office/drawing/2010/main" w="9525">
                   <a:solidFill>
                     <a:srgbClr val="000000"/>
                   </a:solidFill>
@@ -5271,7 +4858,7 @@
             </a:ln>
             <a:extLst>
               <a:ext uri="{91240B29-F687-4f45-9708-019B960494DF}">
-                <a14:hiddenLine xmlns:a14="http://schemas.microsoft.com/office/drawing/2010/main" xmlns="" w="9525">
+                <a14:hiddenLine xmlns="" xmlns:a14="http://schemas.microsoft.com/office/drawing/2010/main" w="9525">
                   <a:solidFill>
                     <a:srgbClr val="000000"/>
                   </a:solidFill>
@@ -5361,7 +4948,7 @@
             </a:ln>
             <a:extLst>
               <a:ext uri="{91240B29-F687-4f45-9708-019B960494DF}">
-                <a14:hiddenLine xmlns:a14="http://schemas.microsoft.com/office/drawing/2010/main" xmlns="" w="9525">
+                <a14:hiddenLine xmlns="" xmlns:a14="http://schemas.microsoft.com/office/drawing/2010/main" w="9525">
                   <a:solidFill>
                     <a:srgbClr val="000000"/>
                   </a:solidFill>
@@ -5429,7 +5016,7 @@
             </a:ln>
             <a:extLst>
               <a:ext uri="{91240B29-F687-4f45-9708-019B960494DF}">
-                <a14:hiddenLine xmlns:a14="http://schemas.microsoft.com/office/drawing/2010/main" xmlns="" w="9525">
+                <a14:hiddenLine xmlns="" xmlns:a14="http://schemas.microsoft.com/office/drawing/2010/main" w="9525">
                   <a:solidFill>
                     <a:srgbClr val="000000"/>
                   </a:solidFill>
@@ -5491,7 +5078,7 @@
             </a:ln>
             <a:extLst>
               <a:ext uri="{91240B29-F687-4f45-9708-019B960494DF}">
-                <a14:hiddenLine xmlns:a14="http://schemas.microsoft.com/office/drawing/2010/main" xmlns="" w="9525">
+                <a14:hiddenLine xmlns="" xmlns:a14="http://schemas.microsoft.com/office/drawing/2010/main" w="9525">
                   <a:solidFill>
                     <a:srgbClr val="000000"/>
                   </a:solidFill>
@@ -5581,7 +5168,7 @@
             </a:ln>
             <a:extLst>
               <a:ext uri="{91240B29-F687-4f45-9708-019B960494DF}">
-                <a14:hiddenLine xmlns:a14="http://schemas.microsoft.com/office/drawing/2010/main" xmlns="" w="9525">
+                <a14:hiddenLine xmlns="" xmlns:a14="http://schemas.microsoft.com/office/drawing/2010/main" w="9525">
                   <a:solidFill>
                     <a:srgbClr val="000000"/>
                   </a:solidFill>
@@ -5643,7 +5230,7 @@
             </a:ln>
             <a:extLst>
               <a:ext uri="{91240B29-F687-4f45-9708-019B960494DF}">
-                <a14:hiddenLine xmlns:a14="http://schemas.microsoft.com/office/drawing/2010/main" xmlns="" w="9525">
+                <a14:hiddenLine xmlns="" xmlns:a14="http://schemas.microsoft.com/office/drawing/2010/main" w="9525">
                   <a:solidFill>
                     <a:srgbClr val="000000"/>
                   </a:solidFill>
@@ -5733,7 +5320,7 @@
             </a:ln>
             <a:extLst>
               <a:ext uri="{91240B29-F687-4f45-9708-019B960494DF}">
-                <a14:hiddenLine xmlns:a14="http://schemas.microsoft.com/office/drawing/2010/main" xmlns="" w="9525">
+                <a14:hiddenLine xmlns="" xmlns:a14="http://schemas.microsoft.com/office/drawing/2010/main" w="9525">
                   <a:solidFill>
                     <a:srgbClr val="000000"/>
                   </a:solidFill>
@@ -5795,7 +5382,7 @@
             </a:ln>
             <a:extLst>
               <a:ext uri="{91240B29-F687-4f45-9708-019B960494DF}">
-                <a14:hiddenLine xmlns:a14="http://schemas.microsoft.com/office/drawing/2010/main" xmlns="" w="9525">
+                <a14:hiddenLine xmlns="" xmlns:a14="http://schemas.microsoft.com/office/drawing/2010/main" w="9525">
                   <a:solidFill>
                     <a:srgbClr val="000000"/>
                   </a:solidFill>
@@ -5885,7 +5472,7 @@
             </a:ln>
             <a:extLst>
               <a:ext uri="{91240B29-F687-4f45-9708-019B960494DF}">
-                <a14:hiddenLine xmlns:a14="http://schemas.microsoft.com/office/drawing/2010/main" xmlns="" w="9525">
+                <a14:hiddenLine xmlns="" xmlns:a14="http://schemas.microsoft.com/office/drawing/2010/main" w="9525">
                   <a:solidFill>
                     <a:srgbClr val="000000"/>
                   </a:solidFill>
@@ -5919,7 +5506,7 @@
             </a:ln>
             <a:extLst>
               <a:ext uri="{91240B29-F687-4f45-9708-019B960494DF}">
-                <a14:hiddenLine xmlns:a14="http://schemas.microsoft.com/office/drawing/2010/main" xmlns="" w="9525">
+                <a14:hiddenLine xmlns="" xmlns:a14="http://schemas.microsoft.com/office/drawing/2010/main" w="9525">
                   <a:solidFill>
                     <a:srgbClr val="000000"/>
                   </a:solidFill>
@@ -5984,7 +5571,7 @@
             </a:ln>
             <a:extLst>
               <a:ext uri="{91240B29-F687-4f45-9708-019B960494DF}">
-                <a14:hiddenLine xmlns:a14="http://schemas.microsoft.com/office/drawing/2010/main" xmlns="" w="9525">
+                <a14:hiddenLine xmlns="" xmlns:a14="http://schemas.microsoft.com/office/drawing/2010/main" w="9525">
                   <a:solidFill>
                     <a:srgbClr val="000000"/>
                   </a:solidFill>
@@ -6074,7 +5661,7 @@
             </a:ln>
             <a:extLst>
               <a:ext uri="{91240B29-F687-4f45-9708-019B960494DF}">
-                <a14:hiddenLine xmlns:a14="http://schemas.microsoft.com/office/drawing/2010/main" xmlns="" w="9525">
+                <a14:hiddenLine xmlns="" xmlns:a14="http://schemas.microsoft.com/office/drawing/2010/main" w="9525">
                   <a:solidFill>
                     <a:srgbClr val="000000"/>
                   </a:solidFill>
@@ -6136,7 +5723,7 @@
             </a:ln>
             <a:extLst>
               <a:ext uri="{91240B29-F687-4f45-9708-019B960494DF}">
-                <a14:hiddenLine xmlns:a14="http://schemas.microsoft.com/office/drawing/2010/main" xmlns="" w="9525">
+                <a14:hiddenLine xmlns="" xmlns:a14="http://schemas.microsoft.com/office/drawing/2010/main" w="9525">
                   <a:solidFill>
                     <a:srgbClr val="000000"/>
                   </a:solidFill>
@@ -6226,7 +5813,7 @@
             </a:ln>
             <a:extLst>
               <a:ext uri="{91240B29-F687-4f45-9708-019B960494DF}">
-                <a14:hiddenLine xmlns:a14="http://schemas.microsoft.com/office/drawing/2010/main" xmlns="" w="9525">
+                <a14:hiddenLine xmlns="" xmlns:a14="http://schemas.microsoft.com/office/drawing/2010/main" w="9525">
                   <a:solidFill>
                     <a:srgbClr val="000000"/>
                   </a:solidFill>
@@ -6316,7 +5903,7 @@
             </a:ln>
             <a:extLst>
               <a:ext uri="{91240B29-F687-4f45-9708-019B960494DF}">
-                <a14:hiddenLine xmlns:a14="http://schemas.microsoft.com/office/drawing/2010/main" xmlns="" w="9525">
+                <a14:hiddenLine xmlns="" xmlns:a14="http://schemas.microsoft.com/office/drawing/2010/main" w="9525">
                   <a:solidFill>
                     <a:srgbClr val="000000"/>
                   </a:solidFill>
@@ -6381,7 +5968,7 @@
             </a:ln>
             <a:extLst>
               <a:ext uri="{91240B29-F687-4f45-9708-019B960494DF}">
-                <a14:hiddenLine xmlns:a14="http://schemas.microsoft.com/office/drawing/2010/main" xmlns="" w="9525">
+                <a14:hiddenLine xmlns="" xmlns:a14="http://schemas.microsoft.com/office/drawing/2010/main" w="9525">
                   <a:solidFill>
                     <a:srgbClr val="000000"/>
                   </a:solidFill>
@@ -6443,7 +6030,7 @@
             </a:ln>
             <a:extLst>
               <a:ext uri="{91240B29-F687-4f45-9708-019B960494DF}">
-                <a14:hiddenLine xmlns:a14="http://schemas.microsoft.com/office/drawing/2010/main" xmlns="" w="9525">
+                <a14:hiddenLine xmlns="" xmlns:a14="http://schemas.microsoft.com/office/drawing/2010/main" w="9525">
                   <a:solidFill>
                     <a:srgbClr val="000000"/>
                   </a:solidFill>
@@ -6533,7 +6120,7 @@
             </a:ln>
             <a:extLst>
               <a:ext uri="{91240B29-F687-4f45-9708-019B960494DF}">
-                <a14:hiddenLine xmlns:a14="http://schemas.microsoft.com/office/drawing/2010/main" xmlns="" w="9525">
+                <a14:hiddenLine xmlns="" xmlns:a14="http://schemas.microsoft.com/office/drawing/2010/main" w="9525">
                   <a:solidFill>
                     <a:srgbClr val="000000"/>
                   </a:solidFill>
@@ -6623,7 +6210,7 @@
             </a:ln>
             <a:extLst>
               <a:ext uri="{91240B29-F687-4f45-9708-019B960494DF}">
-                <a14:hiddenLine xmlns:a14="http://schemas.microsoft.com/office/drawing/2010/main" xmlns="" w="9525">
+                <a14:hiddenLine xmlns="" xmlns:a14="http://schemas.microsoft.com/office/drawing/2010/main" w="9525">
                   <a:solidFill>
                     <a:srgbClr val="000000"/>
                   </a:solidFill>
@@ -6685,7 +6272,7 @@
             </a:ln>
             <a:extLst>
               <a:ext uri="{91240B29-F687-4f45-9708-019B960494DF}">
-                <a14:hiddenLine xmlns:a14="http://schemas.microsoft.com/office/drawing/2010/main" xmlns="" w="9525">
+                <a14:hiddenLine xmlns="" xmlns:a14="http://schemas.microsoft.com/office/drawing/2010/main" w="9525">
                   <a:solidFill>
                     <a:srgbClr val="000000"/>
                   </a:solidFill>
@@ -6805,7 +6392,7 @@
             </a:ln>
             <a:extLst>
               <a:ext uri="{91240B29-F687-4f45-9708-019B960494DF}">
-                <a14:hiddenLine xmlns:a14="http://schemas.microsoft.com/office/drawing/2010/main" xmlns="" w="9525">
+                <a14:hiddenLine xmlns="" xmlns:a14="http://schemas.microsoft.com/office/drawing/2010/main" w="9525">
                   <a:solidFill>
                     <a:srgbClr val="000000"/>
                   </a:solidFill>
@@ -6873,7 +6460,7 @@
             </a:ln>
             <a:extLst>
               <a:ext uri="{91240B29-F687-4f45-9708-019B960494DF}">
-                <a14:hiddenLine xmlns:a14="http://schemas.microsoft.com/office/drawing/2010/main" xmlns="" w="9525">
+                <a14:hiddenLine xmlns="" xmlns:a14="http://schemas.microsoft.com/office/drawing/2010/main" w="9525">
                   <a:solidFill>
                     <a:srgbClr val="000000"/>
                   </a:solidFill>
@@ -6963,7 +6550,7 @@
             </a:ln>
             <a:extLst>
               <a:ext uri="{91240B29-F687-4f45-9708-019B960494DF}">
-                <a14:hiddenLine xmlns:a14="http://schemas.microsoft.com/office/drawing/2010/main" xmlns="" w="9525">
+                <a14:hiddenLine xmlns="" xmlns:a14="http://schemas.microsoft.com/office/drawing/2010/main" w="9525">
                   <a:solidFill>
                     <a:srgbClr val="000000"/>
                   </a:solidFill>
@@ -11692,7 +11279,7 @@
           <a:noFill/>
           <a:extLst>
             <a:ext uri="{909E8E84-426E-40dd-AFC4-6F175D3DCCD1}">
-              <a14:hiddenFill xmlns:a14="http://schemas.microsoft.com/office/drawing/2010/main" xmlns="">
+              <a14:hiddenFill xmlns="" xmlns:a14="http://schemas.microsoft.com/office/drawing/2010/main">
                 <a:solidFill>
                   <a:srgbClr val="FFFFFF"/>
                 </a:solidFill>
@@ -11766,7 +11353,7 @@
               </a:ln>
               <a:extLst>
                 <a:ext uri="{91240B29-F687-4f45-9708-019B960494DF}">
-                  <a14:hiddenLine xmlns:a14="http://schemas.microsoft.com/office/drawing/2010/main" xmlns="" w="9525">
+                  <a14:hiddenLine xmlns="" xmlns:a14="http://schemas.microsoft.com/office/drawing/2010/main" w="9525">
                     <a:solidFill>
                       <a:srgbClr val="000000"/>
                     </a:solidFill>
@@ -11856,7 +11443,7 @@
               </a:ln>
               <a:extLst>
                 <a:ext uri="{91240B29-F687-4f45-9708-019B960494DF}">
-                  <a14:hiddenLine xmlns:a14="http://schemas.microsoft.com/office/drawing/2010/main" xmlns="" w="9525">
+                  <a14:hiddenLine xmlns="" xmlns:a14="http://schemas.microsoft.com/office/drawing/2010/main" w="9525">
                     <a:solidFill>
                       <a:srgbClr val="000000"/>
                     </a:solidFill>
@@ -11946,7 +11533,7 @@
               </a:ln>
               <a:extLst>
                 <a:ext uri="{91240B29-F687-4f45-9708-019B960494DF}">
-                  <a14:hiddenLine xmlns:a14="http://schemas.microsoft.com/office/drawing/2010/main" xmlns="" w="9525">
+                  <a14:hiddenLine xmlns="" xmlns:a14="http://schemas.microsoft.com/office/drawing/2010/main" w="9525">
                     <a:solidFill>
                       <a:srgbClr val="000000"/>
                     </a:solidFill>
@@ -12008,7 +11595,7 @@
               </a:ln>
               <a:extLst>
                 <a:ext uri="{91240B29-F687-4f45-9708-019B960494DF}">
-                  <a14:hiddenLine xmlns:a14="http://schemas.microsoft.com/office/drawing/2010/main" xmlns="" w="9525">
+                  <a14:hiddenLine xmlns="" xmlns:a14="http://schemas.microsoft.com/office/drawing/2010/main" w="9525">
                     <a:solidFill>
                       <a:srgbClr val="000000"/>
                     </a:solidFill>
@@ -12098,7 +11685,7 @@
               </a:ln>
               <a:extLst>
                 <a:ext uri="{91240B29-F687-4f45-9708-019B960494DF}">
-                  <a14:hiddenLine xmlns:a14="http://schemas.microsoft.com/office/drawing/2010/main" xmlns="" w="9525">
+                  <a14:hiddenLine xmlns="" xmlns:a14="http://schemas.microsoft.com/office/drawing/2010/main" w="9525">
                     <a:solidFill>
                       <a:srgbClr val="000000"/>
                     </a:solidFill>
@@ -12160,7 +11747,7 @@
               </a:ln>
               <a:extLst>
                 <a:ext uri="{91240B29-F687-4f45-9708-019B960494DF}">
-                  <a14:hiddenLine xmlns:a14="http://schemas.microsoft.com/office/drawing/2010/main" xmlns="" w="9525">
+                  <a14:hiddenLine xmlns="" xmlns:a14="http://schemas.microsoft.com/office/drawing/2010/main" w="9525">
                     <a:solidFill>
                       <a:srgbClr val="000000"/>
                     </a:solidFill>
@@ -12222,7 +11809,7 @@
               </a:ln>
               <a:extLst>
                 <a:ext uri="{91240B29-F687-4f45-9708-019B960494DF}">
-                  <a14:hiddenLine xmlns:a14="http://schemas.microsoft.com/office/drawing/2010/main" xmlns="" w="9525">
+                  <a14:hiddenLine xmlns="" xmlns:a14="http://schemas.microsoft.com/office/drawing/2010/main" w="9525">
                     <a:solidFill>
                       <a:srgbClr val="000000"/>
                     </a:solidFill>
@@ -12312,7 +11899,7 @@
               </a:ln>
               <a:extLst>
                 <a:ext uri="{91240B29-F687-4f45-9708-019B960494DF}">
-                  <a14:hiddenLine xmlns:a14="http://schemas.microsoft.com/office/drawing/2010/main" xmlns="" w="9525">
+                  <a14:hiddenLine xmlns="" xmlns:a14="http://schemas.microsoft.com/office/drawing/2010/main" w="9525">
                     <a:solidFill>
                       <a:srgbClr val="000000"/>
                     </a:solidFill>
@@ -12402,7 +11989,7 @@
               </a:ln>
               <a:extLst>
                 <a:ext uri="{91240B29-F687-4f45-9708-019B960494DF}">
-                  <a14:hiddenLine xmlns:a14="http://schemas.microsoft.com/office/drawing/2010/main" xmlns="" w="9525">
+                  <a14:hiddenLine xmlns="" xmlns:a14="http://schemas.microsoft.com/office/drawing/2010/main" w="9525">
                     <a:solidFill>
                       <a:srgbClr val="000000"/>
                     </a:solidFill>
@@ -12464,7 +12051,7 @@
               </a:ln>
               <a:extLst>
                 <a:ext uri="{91240B29-F687-4f45-9708-019B960494DF}">
-                  <a14:hiddenLine xmlns:a14="http://schemas.microsoft.com/office/drawing/2010/main" xmlns="" w="9525">
+                  <a14:hiddenLine xmlns="" xmlns:a14="http://schemas.microsoft.com/office/drawing/2010/main" w="9525">
                     <a:solidFill>
                       <a:srgbClr val="000000"/>
                     </a:solidFill>
@@ -12574,7 +12161,7 @@
               </a:ln>
               <a:extLst>
                 <a:ext uri="{91240B29-F687-4f45-9708-019B960494DF}">
-                  <a14:hiddenLine xmlns:a14="http://schemas.microsoft.com/office/drawing/2010/main" xmlns="" w="9525">
+                  <a14:hiddenLine xmlns="" xmlns:a14="http://schemas.microsoft.com/office/drawing/2010/main" w="9525">
                     <a:solidFill>
                       <a:srgbClr val="000000"/>
                     </a:solidFill>
@@ -12658,7 +12245,7 @@
               </a:ln>
               <a:extLst>
                 <a:ext uri="{91240B29-F687-4f45-9708-019B960494DF}">
-                  <a14:hiddenLine xmlns:a14="http://schemas.microsoft.com/office/drawing/2010/main" xmlns="" w="9525">
+                  <a14:hiddenLine xmlns="" xmlns:a14="http://schemas.microsoft.com/office/drawing/2010/main" w="9525">
                     <a:solidFill>
                       <a:srgbClr val="000000"/>
                     </a:solidFill>
@@ -12720,7 +12307,7 @@
               </a:ln>
               <a:extLst>
                 <a:ext uri="{91240B29-F687-4f45-9708-019B960494DF}">
-                  <a14:hiddenLine xmlns:a14="http://schemas.microsoft.com/office/drawing/2010/main" xmlns="" w="9525">
+                  <a14:hiddenLine xmlns="" xmlns:a14="http://schemas.microsoft.com/office/drawing/2010/main" w="9525">
                     <a:solidFill>
                       <a:srgbClr val="000000"/>
                     </a:solidFill>
@@ -12782,7 +12369,7 @@
               </a:ln>
               <a:extLst>
                 <a:ext uri="{91240B29-F687-4f45-9708-019B960494DF}">
-                  <a14:hiddenLine xmlns:a14="http://schemas.microsoft.com/office/drawing/2010/main" xmlns="" w="9525">
+                  <a14:hiddenLine xmlns="" xmlns:a14="http://schemas.microsoft.com/office/drawing/2010/main" w="9525">
                     <a:solidFill>
                       <a:srgbClr val="000000"/>
                     </a:solidFill>
@@ -12872,7 +12459,7 @@
               </a:ln>
               <a:extLst>
                 <a:ext uri="{91240B29-F687-4f45-9708-019B960494DF}">
-                  <a14:hiddenLine xmlns:a14="http://schemas.microsoft.com/office/drawing/2010/main" xmlns="" w="9525">
+                  <a14:hiddenLine xmlns="" xmlns:a14="http://schemas.microsoft.com/office/drawing/2010/main" w="9525">
                     <a:solidFill>
                       <a:srgbClr val="000000"/>
                     </a:solidFill>
@@ -12906,7 +12493,7 @@
               </a:ln>
               <a:extLst>
                 <a:ext uri="{91240B29-F687-4f45-9708-019B960494DF}">
-                  <a14:hiddenLine xmlns:a14="http://schemas.microsoft.com/office/drawing/2010/main" xmlns="" w="9525">
+                  <a14:hiddenLine xmlns="" xmlns:a14="http://schemas.microsoft.com/office/drawing/2010/main" w="9525">
                     <a:solidFill>
                       <a:srgbClr val="000000"/>
                     </a:solidFill>
@@ -12971,7 +12558,7 @@
               </a:ln>
               <a:extLst>
                 <a:ext uri="{91240B29-F687-4f45-9708-019B960494DF}">
-                  <a14:hiddenLine xmlns:a14="http://schemas.microsoft.com/office/drawing/2010/main" xmlns="" w="9525">
+                  <a14:hiddenLine xmlns="" xmlns:a14="http://schemas.microsoft.com/office/drawing/2010/main" w="9525">
                     <a:solidFill>
                       <a:srgbClr val="000000"/>
                     </a:solidFill>
@@ -13061,7 +12648,7 @@
               </a:ln>
               <a:extLst>
                 <a:ext uri="{91240B29-F687-4f45-9708-019B960494DF}">
-                  <a14:hiddenLine xmlns:a14="http://schemas.microsoft.com/office/drawing/2010/main" xmlns="" w="9525">
+                  <a14:hiddenLine xmlns="" xmlns:a14="http://schemas.microsoft.com/office/drawing/2010/main" w="9525">
                     <a:solidFill>
                       <a:srgbClr val="000000"/>
                     </a:solidFill>
@@ -13123,7 +12710,7 @@
               </a:ln>
               <a:extLst>
                 <a:ext uri="{91240B29-F687-4f45-9708-019B960494DF}">
-                  <a14:hiddenLine xmlns:a14="http://schemas.microsoft.com/office/drawing/2010/main" xmlns="" w="9525">
+                  <a14:hiddenLine xmlns="" xmlns:a14="http://schemas.microsoft.com/office/drawing/2010/main" w="9525">
                     <a:solidFill>
                       <a:srgbClr val="000000"/>
                     </a:solidFill>
@@ -13213,7 +12800,7 @@
               </a:ln>
               <a:extLst>
                 <a:ext uri="{91240B29-F687-4f45-9708-019B960494DF}">
-                  <a14:hiddenLine xmlns:a14="http://schemas.microsoft.com/office/drawing/2010/main" xmlns="" w="9525">
+                  <a14:hiddenLine xmlns="" xmlns:a14="http://schemas.microsoft.com/office/drawing/2010/main" w="9525">
                     <a:solidFill>
                       <a:srgbClr val="000000"/>
                     </a:solidFill>
@@ -13278,7 +12865,7 @@
               </a:ln>
               <a:extLst>
                 <a:ext uri="{91240B29-F687-4f45-9708-019B960494DF}">
-                  <a14:hiddenLine xmlns:a14="http://schemas.microsoft.com/office/drawing/2010/main" xmlns="" w="9525">
+                  <a14:hiddenLine xmlns="" xmlns:a14="http://schemas.microsoft.com/office/drawing/2010/main" w="9525">
                     <a:solidFill>
                       <a:srgbClr val="000000"/>
                     </a:solidFill>
@@ -13340,7 +12927,7 @@
               </a:ln>
               <a:extLst>
                 <a:ext uri="{91240B29-F687-4f45-9708-019B960494DF}">
-                  <a14:hiddenLine xmlns:a14="http://schemas.microsoft.com/office/drawing/2010/main" xmlns="" w="9525">
+                  <a14:hiddenLine xmlns="" xmlns:a14="http://schemas.microsoft.com/office/drawing/2010/main" w="9525">
                     <a:solidFill>
                       <a:srgbClr val="000000"/>
                     </a:solidFill>
@@ -13430,7 +13017,7 @@
               </a:ln>
               <a:extLst>
                 <a:ext uri="{91240B29-F687-4f45-9708-019B960494DF}">
-                  <a14:hiddenLine xmlns:a14="http://schemas.microsoft.com/office/drawing/2010/main" xmlns="" w="9525">
+                  <a14:hiddenLine xmlns="" xmlns:a14="http://schemas.microsoft.com/office/drawing/2010/main" w="9525">
                     <a:solidFill>
                       <a:srgbClr val="000000"/>
                     </a:solidFill>
@@ -13520,7 +13107,7 @@
               </a:ln>
               <a:extLst>
                 <a:ext uri="{91240B29-F687-4f45-9708-019B960494DF}">
-                  <a14:hiddenLine xmlns:a14="http://schemas.microsoft.com/office/drawing/2010/main" xmlns="" w="9525">
+                  <a14:hiddenLine xmlns="" xmlns:a14="http://schemas.microsoft.com/office/drawing/2010/main" w="9525">
                     <a:solidFill>
                       <a:srgbClr val="000000"/>
                     </a:solidFill>
@@ -13585,7 +13172,7 @@
               </a:ln>
               <a:extLst>
                 <a:ext uri="{91240B29-F687-4f45-9708-019B960494DF}">
-                  <a14:hiddenLine xmlns:a14="http://schemas.microsoft.com/office/drawing/2010/main" xmlns="" w="9525">
+                  <a14:hiddenLine xmlns="" xmlns:a14="http://schemas.microsoft.com/office/drawing/2010/main" w="9525">
                     <a:solidFill>
                       <a:srgbClr val="000000"/>
                     </a:solidFill>
@@ -13705,7 +13292,7 @@
               </a:ln>
               <a:extLst>
                 <a:ext uri="{91240B29-F687-4f45-9708-019B960494DF}">
-                  <a14:hiddenLine xmlns:a14="http://schemas.microsoft.com/office/drawing/2010/main" xmlns="" w="9525">
+                  <a14:hiddenLine xmlns="" xmlns:a14="http://schemas.microsoft.com/office/drawing/2010/main" w="9525">
                     <a:solidFill>
                       <a:srgbClr val="000000"/>
                     </a:solidFill>
@@ -13786,7 +13373,7 @@
               </a:ln>
               <a:extLst>
                 <a:ext uri="{91240B29-F687-4f45-9708-019B960494DF}">
-                  <a14:hiddenLine xmlns:a14="http://schemas.microsoft.com/office/drawing/2010/main" xmlns="" w="9525">
+                  <a14:hiddenLine xmlns="" xmlns:a14="http://schemas.microsoft.com/office/drawing/2010/main" w="9525">
                     <a:solidFill>
                       <a:srgbClr val="000000"/>
                     </a:solidFill>
@@ -13901,7 +13488,7 @@
               </a:ln>
               <a:extLst>
                 <a:ext uri="{91240B29-F687-4f45-9708-019B960494DF}">
-                  <a14:hiddenLine xmlns:a14="http://schemas.microsoft.com/office/drawing/2010/main" xmlns="" w="9525">
+                  <a14:hiddenLine xmlns="" xmlns:a14="http://schemas.microsoft.com/office/drawing/2010/main" w="9525">
                     <a:solidFill>
                       <a:srgbClr val="000000"/>
                     </a:solidFill>
@@ -13991,7 +13578,7 @@
               </a:ln>
               <a:extLst>
                 <a:ext uri="{91240B29-F687-4f45-9708-019B960494DF}">
-                  <a14:hiddenLine xmlns:a14="http://schemas.microsoft.com/office/drawing/2010/main" xmlns="" w="9525">
+                  <a14:hiddenLine xmlns="" xmlns:a14="http://schemas.microsoft.com/office/drawing/2010/main" w="9525">
                     <a:solidFill>
                       <a:srgbClr val="000000"/>
                     </a:solidFill>
@@ -14056,7 +13643,7 @@
               </a:ln>
               <a:extLst>
                 <a:ext uri="{91240B29-F687-4f45-9708-019B960494DF}">
-                  <a14:hiddenLine xmlns:a14="http://schemas.microsoft.com/office/drawing/2010/main" xmlns="" w="9525">
+                  <a14:hiddenLine xmlns="" xmlns:a14="http://schemas.microsoft.com/office/drawing/2010/main" w="9525">
                     <a:solidFill>
                       <a:srgbClr val="000000"/>
                     </a:solidFill>
@@ -14146,7 +13733,7 @@
               </a:ln>
               <a:extLst>
                 <a:ext uri="{91240B29-F687-4f45-9708-019B960494DF}">
-                  <a14:hiddenLine xmlns:a14="http://schemas.microsoft.com/office/drawing/2010/main" xmlns="" w="9525">
+                  <a14:hiddenLine xmlns="" xmlns:a14="http://schemas.microsoft.com/office/drawing/2010/main" w="9525">
                     <a:solidFill>
                       <a:srgbClr val="000000"/>
                     </a:solidFill>
@@ -14214,7 +13801,7 @@
               </a:ln>
               <a:extLst>
                 <a:ext uri="{91240B29-F687-4f45-9708-019B960494DF}">
-                  <a14:hiddenLine xmlns:a14="http://schemas.microsoft.com/office/drawing/2010/main" xmlns="" w="9525">
+                  <a14:hiddenLine xmlns="" xmlns:a14="http://schemas.microsoft.com/office/drawing/2010/main" w="9525">
                     <a:solidFill>
                       <a:srgbClr val="000000"/>
                     </a:solidFill>
@@ -14304,7 +13891,7 @@
               </a:ln>
               <a:extLst>
                 <a:ext uri="{91240B29-F687-4f45-9708-019B960494DF}">
-                  <a14:hiddenLine xmlns:a14="http://schemas.microsoft.com/office/drawing/2010/main" xmlns="" w="9525">
+                  <a14:hiddenLine xmlns="" xmlns:a14="http://schemas.microsoft.com/office/drawing/2010/main" w="9525">
                     <a:solidFill>
                       <a:srgbClr val="000000"/>
                     </a:solidFill>
@@ -14372,7 +13959,7 @@
               </a:ln>
               <a:extLst>
                 <a:ext uri="{91240B29-F687-4f45-9708-019B960494DF}">
-                  <a14:hiddenLine xmlns:a14="http://schemas.microsoft.com/office/drawing/2010/main" xmlns="" w="9525">
+                  <a14:hiddenLine xmlns="" xmlns:a14="http://schemas.microsoft.com/office/drawing/2010/main" w="9525">
                     <a:solidFill>
                       <a:srgbClr val="000000"/>
                     </a:solidFill>
@@ -14462,7 +14049,7 @@
               </a:ln>
               <a:extLst>
                 <a:ext uri="{91240B29-F687-4f45-9708-019B960494DF}">
-                  <a14:hiddenLine xmlns:a14="http://schemas.microsoft.com/office/drawing/2010/main" xmlns="" w="9525">
+                  <a14:hiddenLine xmlns="" xmlns:a14="http://schemas.microsoft.com/office/drawing/2010/main" w="9525">
                     <a:solidFill>
                       <a:srgbClr val="000000"/>
                     </a:solidFill>
@@ -14496,7 +14083,7 @@
               </a:ln>
               <a:extLst>
                 <a:ext uri="{91240B29-F687-4f45-9708-019B960494DF}">
-                  <a14:hiddenLine xmlns:a14="http://schemas.microsoft.com/office/drawing/2010/main" xmlns="" w="9525">
+                  <a14:hiddenLine xmlns="" xmlns:a14="http://schemas.microsoft.com/office/drawing/2010/main" w="9525">
                     <a:solidFill>
                       <a:srgbClr val="000000"/>
                     </a:solidFill>
@@ -15349,7 +14936,6 @@
               <a:rPr lang="id-ID" dirty="0" smtClean="0"/>
               <a:t>Dean zaka hidayat - 1106016821</a:t>
             </a:r>
-            <a:endParaRPr lang="id-ID" dirty="0" smtClean="0"/>
           </a:p>
         </p:txBody>
       </p:sp>
@@ -15965,6 +15551,1409 @@
             <p:ph type="title"/>
           </p:nvPr>
         </p:nvSpPr>
+        <p:spPr>
+          <a:xfrm>
+            <a:off x="1141413" y="618518"/>
+            <a:ext cx="9905998" cy="981682"/>
+          </a:xfrm>
+        </p:spPr>
+        <p:txBody>
+          <a:bodyPr/>
+          <a:lstStyle/>
+          <a:p>
+            <a:pPr algn="r"/>
+            <a:r>
+              <a:rPr lang="id-ID" dirty="0" smtClean="0"/>
+              <a:t>Model sistem (sumbu x dan y)</a:t>
+            </a:r>
+            <a:endParaRPr lang="id-ID" dirty="0"/>
+          </a:p>
+        </p:txBody>
+      </p:sp>
+      <p:pic>
+        <p:nvPicPr>
+          <p:cNvPr id="6" name="Picture 5"/>
+          <p:cNvPicPr>
+            <a:picLocks noChangeAspect="1"/>
+          </p:cNvPicPr>
+          <p:nvPr/>
+        </p:nvPicPr>
+        <p:blipFill>
+          <a:blip r:embed="rId2"/>
+          <a:stretch>
+            <a:fillRect/>
+          </a:stretch>
+        </p:blipFill>
+        <p:spPr>
+          <a:xfrm>
+            <a:off x="1141413" y="2029617"/>
+            <a:ext cx="4857750" cy="2468880"/>
+          </a:xfrm>
+          <a:prstGeom prst="rect">
+            <a:avLst/>
+          </a:prstGeom>
+        </p:spPr>
+      </p:pic>
+      <mc:AlternateContent xmlns:mc="http://schemas.openxmlformats.org/markup-compatibility/2006">
+        <mc:Choice xmlns:a14="http://schemas.microsoft.com/office/drawing/2010/main" Requires="a14">
+          <p:sp>
+            <p:nvSpPr>
+              <p:cNvPr id="7" name="Rectangle 6"/>
+              <p:cNvSpPr/>
+              <p:nvPr/>
+            </p:nvSpPr>
+            <p:spPr>
+              <a:xfrm>
+                <a:off x="5801233" y="2377860"/>
+                <a:ext cx="6096000" cy="2004523"/>
+              </a:xfrm>
+              <a:prstGeom prst="rect">
+                <a:avLst/>
+              </a:prstGeom>
+            </p:spPr>
+            <p:txBody>
+              <a:bodyPr>
+                <a:spAutoFit/>
+              </a:bodyPr>
+              <a:lstStyle/>
+              <a:p>
+                <a:pPr>
+                  <a:lnSpc>
+                    <a:spcPct val="107000"/>
+                  </a:lnSpc>
+                  <a:spcAft>
+                    <a:spcPts val="800"/>
+                  </a:spcAft>
+                </a:pPr>
+                <a14:m>
+                  <m:oMathPara xmlns:m="http://schemas.openxmlformats.org/officeDocument/2006/math">
+                    <m:oMathParaPr>
+                      <m:jc m:val="centerGroup"/>
+                    </m:oMathParaPr>
+                    <m:oMath xmlns:m="http://schemas.openxmlformats.org/officeDocument/2006/math">
+                      <m:func>
+                        <m:funcPr>
+                          <m:ctrlPr>
+                            <a:rPr lang="id-ID" i="1">
+                              <a:latin typeface="Cambria Math" panose="02040503050406030204" pitchFamily="18" charset="0"/>
+                              <a:ea typeface="Calibri" panose="020F0502020204030204" pitchFamily="34" charset="0"/>
+                              <a:cs typeface="Times New Roman" panose="02020603050405020304" pitchFamily="18" charset="0"/>
+                            </a:rPr>
+                          </m:ctrlPr>
+                        </m:funcPr>
+                        <m:fName>
+                          <m:r>
+                            <m:rPr>
+                              <m:sty m:val="p"/>
+                            </m:rPr>
+                            <a:rPr lang="id-ID">
+                              <a:effectLst/>
+                              <a:latin typeface="Cambria Math" panose="02040503050406030204" pitchFamily="18" charset="0"/>
+                              <a:ea typeface="Calibri" panose="020F0502020204030204" pitchFamily="34" charset="0"/>
+                              <a:cs typeface="Times New Roman" panose="02020603050405020304" pitchFamily="18" charset="0"/>
+                            </a:rPr>
+                            <m:t>tan</m:t>
+                          </m:r>
+                        </m:fName>
+                        <m:e>
+                          <m:r>
+                            <a:rPr lang="id-ID" i="1">
+                              <a:effectLst/>
+                              <a:latin typeface="Cambria Math" panose="02040503050406030204" pitchFamily="18" charset="0"/>
+                              <a:ea typeface="Calibri" panose="020F0502020204030204" pitchFamily="34" charset="0"/>
+                              <a:cs typeface="Times New Roman" panose="02020603050405020304" pitchFamily="18" charset="0"/>
+                            </a:rPr>
+                            <m:t>𝛼</m:t>
+                          </m:r>
+                          <m:r>
+                            <a:rPr lang="id-ID" i="1">
+                              <a:effectLst/>
+                              <a:latin typeface="Cambria Math" panose="02040503050406030204" pitchFamily="18" charset="0"/>
+                              <a:ea typeface="Calibri" panose="020F0502020204030204" pitchFamily="34" charset="0"/>
+                              <a:cs typeface="Times New Roman" panose="02020603050405020304" pitchFamily="18" charset="0"/>
+                            </a:rPr>
+                            <m:t> ×</m:t>
+                          </m:r>
+                          <m:r>
+                            <a:rPr lang="id-ID" i="1">
+                              <a:effectLst/>
+                              <a:latin typeface="Cambria Math" panose="02040503050406030204" pitchFamily="18" charset="0"/>
+                              <a:ea typeface="Calibri" panose="020F0502020204030204" pitchFamily="34" charset="0"/>
+                              <a:cs typeface="Times New Roman" panose="02020603050405020304" pitchFamily="18" charset="0"/>
+                            </a:rPr>
+                            <m:t>𝑥</m:t>
+                          </m:r>
+                          <m:r>
+                            <a:rPr lang="id-ID" i="1">
+                              <a:effectLst/>
+                              <a:latin typeface="Cambria Math" panose="02040503050406030204" pitchFamily="18" charset="0"/>
+                              <a:ea typeface="Calibri" panose="020F0502020204030204" pitchFamily="34" charset="0"/>
+                              <a:cs typeface="Times New Roman" panose="02020603050405020304" pitchFamily="18" charset="0"/>
+                            </a:rPr>
+                            <m:t>=</m:t>
+                          </m:r>
+                          <m:func>
+                            <m:funcPr>
+                              <m:ctrlPr>
+                                <a:rPr lang="id-ID" i="1">
+                                  <a:effectLst/>
+                                  <a:latin typeface="Cambria Math" panose="02040503050406030204" pitchFamily="18" charset="0"/>
+                                  <a:ea typeface="Calibri" panose="020F0502020204030204" pitchFamily="34" charset="0"/>
+                                  <a:cs typeface="Times New Roman" panose="02020603050405020304" pitchFamily="18" charset="0"/>
+                                </a:rPr>
+                              </m:ctrlPr>
+                            </m:funcPr>
+                            <m:fName>
+                              <m:r>
+                                <m:rPr>
+                                  <m:sty m:val="p"/>
+                                </m:rPr>
+                                <a:rPr lang="id-ID">
+                                  <a:effectLst/>
+                                  <a:latin typeface="Cambria Math" panose="02040503050406030204" pitchFamily="18" charset="0"/>
+                                  <a:ea typeface="Calibri" panose="020F0502020204030204" pitchFamily="34" charset="0"/>
+                                  <a:cs typeface="Times New Roman" panose="02020603050405020304" pitchFamily="18" charset="0"/>
+                                </a:rPr>
+                                <m:t>tan</m:t>
+                              </m:r>
+                            </m:fName>
+                            <m:e>
+                              <m:r>
+                                <a:rPr lang="id-ID" i="1">
+                                  <a:effectLst/>
+                                  <a:latin typeface="Cambria Math" panose="02040503050406030204" pitchFamily="18" charset="0"/>
+                                  <a:ea typeface="Calibri" panose="020F0502020204030204" pitchFamily="34" charset="0"/>
+                                  <a:cs typeface="Times New Roman" panose="02020603050405020304" pitchFamily="18" charset="0"/>
+                                </a:rPr>
+                                <m:t>𝛽</m:t>
+                              </m:r>
+                              <m:r>
+                                <a:rPr lang="id-ID" i="1">
+                                  <a:effectLst/>
+                                  <a:latin typeface="Cambria Math" panose="02040503050406030204" pitchFamily="18" charset="0"/>
+                                  <a:ea typeface="Calibri" panose="020F0502020204030204" pitchFamily="34" charset="0"/>
+                                  <a:cs typeface="Times New Roman" panose="02020603050405020304" pitchFamily="18" charset="0"/>
+                                </a:rPr>
+                                <m:t> ×(</m:t>
+                              </m:r>
+                            </m:e>
+                          </m:func>
+                        </m:e>
+                      </m:func>
+                      <m:r>
+                        <a:rPr lang="id-ID" i="1">
+                          <a:effectLst/>
+                          <a:latin typeface="Cambria Math" panose="02040503050406030204" pitchFamily="18" charset="0"/>
+                          <a:ea typeface="Calibri" panose="020F0502020204030204" pitchFamily="34" charset="0"/>
+                          <a:cs typeface="Times New Roman" panose="02020603050405020304" pitchFamily="18" charset="0"/>
+                        </a:rPr>
+                        <m:t>𝑑𝑖𝑠𝑡𝑎𝑛𝑐𝑒</m:t>
+                      </m:r>
+                      <m:r>
+                        <a:rPr lang="id-ID" i="1">
+                          <a:effectLst/>
+                          <a:latin typeface="Cambria Math" panose="02040503050406030204" pitchFamily="18" charset="0"/>
+                          <a:ea typeface="Calibri" panose="020F0502020204030204" pitchFamily="34" charset="0"/>
+                          <a:cs typeface="Times New Roman" panose="02020603050405020304" pitchFamily="18" charset="0"/>
+                        </a:rPr>
+                        <m:t>−</m:t>
+                      </m:r>
+                      <m:r>
+                        <a:rPr lang="id-ID" i="1">
+                          <a:effectLst/>
+                          <a:latin typeface="Cambria Math" panose="02040503050406030204" pitchFamily="18" charset="0"/>
+                          <a:ea typeface="Calibri" panose="020F0502020204030204" pitchFamily="34" charset="0"/>
+                          <a:cs typeface="Times New Roman" panose="02020603050405020304" pitchFamily="18" charset="0"/>
+                        </a:rPr>
+                        <m:t>𝑥</m:t>
+                      </m:r>
+                      <m:r>
+                        <a:rPr lang="id-ID" i="1">
+                          <a:effectLst/>
+                          <a:latin typeface="Cambria Math" panose="02040503050406030204" pitchFamily="18" charset="0"/>
+                          <a:ea typeface="Calibri" panose="020F0502020204030204" pitchFamily="34" charset="0"/>
+                          <a:cs typeface="Times New Roman" panose="02020603050405020304" pitchFamily="18" charset="0"/>
+                        </a:rPr>
+                        <m:t>)</m:t>
+                      </m:r>
+                    </m:oMath>
+                  </m:oMathPara>
+                </a14:m>
+                <a:endParaRPr lang="id-ID" dirty="0">
+                  <a:effectLst/>
+                  <a:latin typeface="Calibri" panose="020F0502020204030204" pitchFamily="34" charset="0"/>
+                  <a:ea typeface="Calibri" panose="020F0502020204030204" pitchFamily="34" charset="0"/>
+                  <a:cs typeface="Times New Roman" panose="02020603050405020304" pitchFamily="18" charset="0"/>
+                </a:endParaRPr>
+              </a:p>
+              <a:p>
+                <a:pPr>
+                  <a:lnSpc>
+                    <a:spcPct val="107000"/>
+                  </a:lnSpc>
+                  <a:spcAft>
+                    <a:spcPts val="800"/>
+                  </a:spcAft>
+                </a:pPr>
+                <a14:m>
+                  <m:oMathPara xmlns:m="http://schemas.openxmlformats.org/officeDocument/2006/math">
+                    <m:oMathParaPr>
+                      <m:jc m:val="centerGroup"/>
+                    </m:oMathParaPr>
+                    <m:oMath xmlns:m="http://schemas.openxmlformats.org/officeDocument/2006/math">
+                      <m:func>
+                        <m:funcPr>
+                          <m:ctrlPr>
+                            <a:rPr lang="id-ID" i="1">
+                              <a:effectLst/>
+                              <a:latin typeface="Cambria Math" panose="02040503050406030204" pitchFamily="18" charset="0"/>
+                              <a:ea typeface="Calibri" panose="020F0502020204030204" pitchFamily="34" charset="0"/>
+                              <a:cs typeface="Times New Roman" panose="02020603050405020304" pitchFamily="18" charset="0"/>
+                            </a:rPr>
+                          </m:ctrlPr>
+                        </m:funcPr>
+                        <m:fName>
+                          <m:r>
+                            <m:rPr>
+                              <m:sty m:val="p"/>
+                            </m:rPr>
+                            <a:rPr lang="id-ID">
+                              <a:effectLst/>
+                              <a:latin typeface="Cambria Math" panose="02040503050406030204" pitchFamily="18" charset="0"/>
+                              <a:ea typeface="Calibri" panose="020F0502020204030204" pitchFamily="34" charset="0"/>
+                              <a:cs typeface="Times New Roman" panose="02020603050405020304" pitchFamily="18" charset="0"/>
+                            </a:rPr>
+                            <m:t>tan</m:t>
+                          </m:r>
+                        </m:fName>
+                        <m:e>
+                          <m:r>
+                            <a:rPr lang="id-ID" i="1">
+                              <a:effectLst/>
+                              <a:latin typeface="Cambria Math" panose="02040503050406030204" pitchFamily="18" charset="0"/>
+                              <a:ea typeface="Calibri" panose="020F0502020204030204" pitchFamily="34" charset="0"/>
+                              <a:cs typeface="Times New Roman" panose="02020603050405020304" pitchFamily="18" charset="0"/>
+                            </a:rPr>
+                            <m:t>𝛼</m:t>
+                          </m:r>
+                          <m:r>
+                            <a:rPr lang="id-ID" i="1">
+                              <a:effectLst/>
+                              <a:latin typeface="Cambria Math" panose="02040503050406030204" pitchFamily="18" charset="0"/>
+                              <a:ea typeface="Calibri" panose="020F0502020204030204" pitchFamily="34" charset="0"/>
+                              <a:cs typeface="Times New Roman" panose="02020603050405020304" pitchFamily="18" charset="0"/>
+                            </a:rPr>
+                            <m:t> ×</m:t>
+                          </m:r>
+                          <m:r>
+                            <a:rPr lang="id-ID" i="1">
+                              <a:effectLst/>
+                              <a:latin typeface="Cambria Math" panose="02040503050406030204" pitchFamily="18" charset="0"/>
+                              <a:ea typeface="Calibri" panose="020F0502020204030204" pitchFamily="34" charset="0"/>
+                              <a:cs typeface="Times New Roman" panose="02020603050405020304" pitchFamily="18" charset="0"/>
+                            </a:rPr>
+                            <m:t>𝑥</m:t>
+                          </m:r>
+                          <m:r>
+                            <a:rPr lang="id-ID" i="1">
+                              <a:effectLst/>
+                              <a:latin typeface="Cambria Math" panose="02040503050406030204" pitchFamily="18" charset="0"/>
+                              <a:ea typeface="Calibri" panose="020F0502020204030204" pitchFamily="34" charset="0"/>
+                              <a:cs typeface="Times New Roman" panose="02020603050405020304" pitchFamily="18" charset="0"/>
+                            </a:rPr>
+                            <m:t>=</m:t>
+                          </m:r>
+                          <m:func>
+                            <m:funcPr>
+                              <m:ctrlPr>
+                                <a:rPr lang="id-ID" i="1">
+                                  <a:effectLst/>
+                                  <a:latin typeface="Cambria Math" panose="02040503050406030204" pitchFamily="18" charset="0"/>
+                                  <a:ea typeface="Calibri" panose="020F0502020204030204" pitchFamily="34" charset="0"/>
+                                  <a:cs typeface="Times New Roman" panose="02020603050405020304" pitchFamily="18" charset="0"/>
+                                </a:rPr>
+                              </m:ctrlPr>
+                            </m:funcPr>
+                            <m:fName>
+                              <m:r>
+                                <a:rPr lang="id-ID">
+                                  <a:effectLst/>
+                                  <a:latin typeface="Cambria Math" panose="02040503050406030204" pitchFamily="18" charset="0"/>
+                                  <a:ea typeface="Calibri" panose="020F0502020204030204" pitchFamily="34" charset="0"/>
+                                  <a:cs typeface="Times New Roman" panose="02020603050405020304" pitchFamily="18" charset="0"/>
+                                </a:rPr>
+                                <m:t>(</m:t>
+                              </m:r>
+                              <m:r>
+                                <m:rPr>
+                                  <m:sty m:val="p"/>
+                                </m:rPr>
+                                <a:rPr lang="id-ID">
+                                  <a:effectLst/>
+                                  <a:latin typeface="Cambria Math" panose="02040503050406030204" pitchFamily="18" charset="0"/>
+                                  <a:ea typeface="Calibri" panose="020F0502020204030204" pitchFamily="34" charset="0"/>
+                                  <a:cs typeface="Times New Roman" panose="02020603050405020304" pitchFamily="18" charset="0"/>
+                                </a:rPr>
+                                <m:t>tan</m:t>
+                              </m:r>
+                            </m:fName>
+                            <m:e>
+                              <m:r>
+                                <a:rPr lang="id-ID" i="1">
+                                  <a:effectLst/>
+                                  <a:latin typeface="Cambria Math" panose="02040503050406030204" pitchFamily="18" charset="0"/>
+                                  <a:ea typeface="Calibri" panose="020F0502020204030204" pitchFamily="34" charset="0"/>
+                                  <a:cs typeface="Times New Roman" panose="02020603050405020304" pitchFamily="18" charset="0"/>
+                                </a:rPr>
+                                <m:t>𝛽</m:t>
+                              </m:r>
+                              <m:r>
+                                <a:rPr lang="id-ID" i="1">
+                                  <a:effectLst/>
+                                  <a:latin typeface="Cambria Math" panose="02040503050406030204" pitchFamily="18" charset="0"/>
+                                  <a:ea typeface="Calibri" panose="020F0502020204030204" pitchFamily="34" charset="0"/>
+                                  <a:cs typeface="Times New Roman" panose="02020603050405020304" pitchFamily="18" charset="0"/>
+                                </a:rPr>
+                                <m:t> ×</m:t>
+                              </m:r>
+                            </m:e>
+                          </m:func>
+                        </m:e>
+                      </m:func>
+                      <m:r>
+                        <a:rPr lang="id-ID" i="1">
+                          <a:effectLst/>
+                          <a:latin typeface="Cambria Math" panose="02040503050406030204" pitchFamily="18" charset="0"/>
+                          <a:ea typeface="Calibri" panose="020F0502020204030204" pitchFamily="34" charset="0"/>
+                          <a:cs typeface="Times New Roman" panose="02020603050405020304" pitchFamily="18" charset="0"/>
+                        </a:rPr>
+                        <m:t>𝑑𝑖𝑠𝑡𝑎𝑛𝑐𝑒</m:t>
+                      </m:r>
+                      <m:r>
+                        <a:rPr lang="id-ID" i="1">
+                          <a:effectLst/>
+                          <a:latin typeface="Cambria Math" panose="02040503050406030204" pitchFamily="18" charset="0"/>
+                          <a:ea typeface="Calibri" panose="020F0502020204030204" pitchFamily="34" charset="0"/>
+                          <a:cs typeface="Times New Roman" panose="02020603050405020304" pitchFamily="18" charset="0"/>
+                        </a:rPr>
+                        <m:t>)−(</m:t>
+                      </m:r>
+                      <m:func>
+                        <m:funcPr>
+                          <m:ctrlPr>
+                            <a:rPr lang="id-ID" i="1">
+                              <a:effectLst/>
+                              <a:latin typeface="Cambria Math" panose="02040503050406030204" pitchFamily="18" charset="0"/>
+                              <a:ea typeface="Calibri" panose="020F0502020204030204" pitchFamily="34" charset="0"/>
+                              <a:cs typeface="Times New Roman" panose="02020603050405020304" pitchFamily="18" charset="0"/>
+                            </a:rPr>
+                          </m:ctrlPr>
+                        </m:funcPr>
+                        <m:fName>
+                          <m:r>
+                            <m:rPr>
+                              <m:sty m:val="p"/>
+                            </m:rPr>
+                            <a:rPr lang="id-ID">
+                              <a:effectLst/>
+                              <a:latin typeface="Cambria Math" panose="02040503050406030204" pitchFamily="18" charset="0"/>
+                              <a:ea typeface="Calibri" panose="020F0502020204030204" pitchFamily="34" charset="0"/>
+                              <a:cs typeface="Times New Roman" panose="02020603050405020304" pitchFamily="18" charset="0"/>
+                            </a:rPr>
+                            <m:t>tan</m:t>
+                          </m:r>
+                        </m:fName>
+                        <m:e>
+                          <m:r>
+                            <a:rPr lang="id-ID" i="1">
+                              <a:effectLst/>
+                              <a:latin typeface="Cambria Math" panose="02040503050406030204" pitchFamily="18" charset="0"/>
+                              <a:ea typeface="Calibri" panose="020F0502020204030204" pitchFamily="34" charset="0"/>
+                              <a:cs typeface="Times New Roman" panose="02020603050405020304" pitchFamily="18" charset="0"/>
+                            </a:rPr>
+                            <m:t>𝛽</m:t>
+                          </m:r>
+                          <m:r>
+                            <a:rPr lang="id-ID" i="1">
+                              <a:effectLst/>
+                              <a:latin typeface="Cambria Math" panose="02040503050406030204" pitchFamily="18" charset="0"/>
+                              <a:ea typeface="Calibri" panose="020F0502020204030204" pitchFamily="34" charset="0"/>
+                              <a:cs typeface="Times New Roman" panose="02020603050405020304" pitchFamily="18" charset="0"/>
+                            </a:rPr>
+                            <m:t> ×</m:t>
+                          </m:r>
+                        </m:e>
+                      </m:func>
+                      <m:r>
+                        <a:rPr lang="id-ID" i="1">
+                          <a:effectLst/>
+                          <a:latin typeface="Cambria Math" panose="02040503050406030204" pitchFamily="18" charset="0"/>
+                          <a:ea typeface="Calibri" panose="020F0502020204030204" pitchFamily="34" charset="0"/>
+                          <a:cs typeface="Times New Roman" panose="02020603050405020304" pitchFamily="18" charset="0"/>
+                        </a:rPr>
+                        <m:t>𝑥</m:t>
+                      </m:r>
+                      <m:r>
+                        <a:rPr lang="id-ID" i="1">
+                          <a:effectLst/>
+                          <a:latin typeface="Cambria Math" panose="02040503050406030204" pitchFamily="18" charset="0"/>
+                          <a:ea typeface="Calibri" panose="020F0502020204030204" pitchFamily="34" charset="0"/>
+                          <a:cs typeface="Times New Roman" panose="02020603050405020304" pitchFamily="18" charset="0"/>
+                        </a:rPr>
+                        <m:t>)</m:t>
+                      </m:r>
+                    </m:oMath>
+                  </m:oMathPara>
+                </a14:m>
+                <a:endParaRPr lang="id-ID" dirty="0">
+                  <a:effectLst/>
+                  <a:latin typeface="Calibri" panose="020F0502020204030204" pitchFamily="34" charset="0"/>
+                  <a:ea typeface="Calibri" panose="020F0502020204030204" pitchFamily="34" charset="0"/>
+                  <a:cs typeface="Times New Roman" panose="02020603050405020304" pitchFamily="18" charset="0"/>
+                </a:endParaRPr>
+              </a:p>
+              <a:p>
+                <a:pPr>
+                  <a:lnSpc>
+                    <a:spcPct val="107000"/>
+                  </a:lnSpc>
+                  <a:spcAft>
+                    <a:spcPts val="800"/>
+                  </a:spcAft>
+                </a:pPr>
+                <a14:m>
+                  <m:oMathPara xmlns:m="http://schemas.openxmlformats.org/officeDocument/2006/math">
+                    <m:oMathParaPr>
+                      <m:jc m:val="centerGroup"/>
+                    </m:oMathParaPr>
+                    <m:oMath xmlns:m="http://schemas.openxmlformats.org/officeDocument/2006/math">
+                      <m:func>
+                        <m:funcPr>
+                          <m:ctrlPr>
+                            <a:rPr lang="id-ID" i="1">
+                              <a:effectLst/>
+                              <a:latin typeface="Cambria Math" panose="02040503050406030204" pitchFamily="18" charset="0"/>
+                              <a:ea typeface="Calibri" panose="020F0502020204030204" pitchFamily="34" charset="0"/>
+                              <a:cs typeface="Times New Roman" panose="02020603050405020304" pitchFamily="18" charset="0"/>
+                            </a:rPr>
+                          </m:ctrlPr>
+                        </m:funcPr>
+                        <m:fName>
+                          <m:r>
+                            <m:rPr>
+                              <m:sty m:val="p"/>
+                            </m:rPr>
+                            <a:rPr lang="id-ID">
+                              <a:effectLst/>
+                              <a:latin typeface="Cambria Math" panose="02040503050406030204" pitchFamily="18" charset="0"/>
+                              <a:ea typeface="Calibri" panose="020F0502020204030204" pitchFamily="34" charset="0"/>
+                              <a:cs typeface="Times New Roman" panose="02020603050405020304" pitchFamily="18" charset="0"/>
+                            </a:rPr>
+                            <m:t>tan</m:t>
+                          </m:r>
+                        </m:fName>
+                        <m:e>
+                          <m:r>
+                            <a:rPr lang="id-ID" i="1">
+                              <a:effectLst/>
+                              <a:latin typeface="Cambria Math" panose="02040503050406030204" pitchFamily="18" charset="0"/>
+                              <a:ea typeface="Calibri" panose="020F0502020204030204" pitchFamily="34" charset="0"/>
+                              <a:cs typeface="Times New Roman" panose="02020603050405020304" pitchFamily="18" charset="0"/>
+                            </a:rPr>
+                            <m:t>𝛽</m:t>
+                          </m:r>
+                          <m:r>
+                            <a:rPr lang="id-ID" i="1">
+                              <a:effectLst/>
+                              <a:latin typeface="Cambria Math" panose="02040503050406030204" pitchFamily="18" charset="0"/>
+                              <a:ea typeface="Calibri" panose="020F0502020204030204" pitchFamily="34" charset="0"/>
+                              <a:cs typeface="Times New Roman" panose="02020603050405020304" pitchFamily="18" charset="0"/>
+                            </a:rPr>
+                            <m:t>×</m:t>
+                          </m:r>
+                        </m:e>
+                      </m:func>
+                      <m:r>
+                        <a:rPr lang="id-ID" i="1">
+                          <a:effectLst/>
+                          <a:latin typeface="Cambria Math" panose="02040503050406030204" pitchFamily="18" charset="0"/>
+                          <a:ea typeface="Calibri" panose="020F0502020204030204" pitchFamily="34" charset="0"/>
+                          <a:cs typeface="Times New Roman" panose="02020603050405020304" pitchFamily="18" charset="0"/>
+                        </a:rPr>
+                        <m:t>𝑑𝑖𝑠𝑡𝑎𝑛𝑐𝑒</m:t>
+                      </m:r>
+                      <m:r>
+                        <a:rPr lang="id-ID" i="1">
+                          <a:effectLst/>
+                          <a:latin typeface="Cambria Math" panose="02040503050406030204" pitchFamily="18" charset="0"/>
+                          <a:ea typeface="Calibri" panose="020F0502020204030204" pitchFamily="34" charset="0"/>
+                          <a:cs typeface="Times New Roman" panose="02020603050405020304" pitchFamily="18" charset="0"/>
+                        </a:rPr>
+                        <m:t>=(</m:t>
+                      </m:r>
+                      <m:func>
+                        <m:funcPr>
+                          <m:ctrlPr>
+                            <a:rPr lang="id-ID" i="1">
+                              <a:effectLst/>
+                              <a:latin typeface="Cambria Math" panose="02040503050406030204" pitchFamily="18" charset="0"/>
+                              <a:ea typeface="Calibri" panose="020F0502020204030204" pitchFamily="34" charset="0"/>
+                              <a:cs typeface="Times New Roman" panose="02020603050405020304" pitchFamily="18" charset="0"/>
+                            </a:rPr>
+                          </m:ctrlPr>
+                        </m:funcPr>
+                        <m:fName>
+                          <m:r>
+                            <m:rPr>
+                              <m:sty m:val="p"/>
+                            </m:rPr>
+                            <a:rPr lang="id-ID">
+                              <a:effectLst/>
+                              <a:latin typeface="Cambria Math" panose="02040503050406030204" pitchFamily="18" charset="0"/>
+                              <a:ea typeface="Calibri" panose="020F0502020204030204" pitchFamily="34" charset="0"/>
+                              <a:cs typeface="Times New Roman" panose="02020603050405020304" pitchFamily="18" charset="0"/>
+                            </a:rPr>
+                            <m:t>tan</m:t>
+                          </m:r>
+                        </m:fName>
+                        <m:e>
+                          <m:r>
+                            <a:rPr lang="id-ID" i="1">
+                              <a:effectLst/>
+                              <a:latin typeface="Cambria Math" panose="02040503050406030204" pitchFamily="18" charset="0"/>
+                              <a:ea typeface="Calibri" panose="020F0502020204030204" pitchFamily="34" charset="0"/>
+                              <a:cs typeface="Times New Roman" panose="02020603050405020304" pitchFamily="18" charset="0"/>
+                            </a:rPr>
+                            <m:t>𝛼</m:t>
+                          </m:r>
+                          <m:r>
+                            <a:rPr lang="id-ID" i="1">
+                              <a:effectLst/>
+                              <a:latin typeface="Cambria Math" panose="02040503050406030204" pitchFamily="18" charset="0"/>
+                              <a:ea typeface="Calibri" panose="020F0502020204030204" pitchFamily="34" charset="0"/>
+                              <a:cs typeface="Times New Roman" panose="02020603050405020304" pitchFamily="18" charset="0"/>
+                            </a:rPr>
+                            <m:t>×</m:t>
+                          </m:r>
+                          <m:r>
+                            <a:rPr lang="id-ID" i="1">
+                              <a:effectLst/>
+                              <a:latin typeface="Cambria Math" panose="02040503050406030204" pitchFamily="18" charset="0"/>
+                              <a:ea typeface="Calibri" panose="020F0502020204030204" pitchFamily="34" charset="0"/>
+                              <a:cs typeface="Times New Roman" panose="02020603050405020304" pitchFamily="18" charset="0"/>
+                            </a:rPr>
+                            <m:t>𝑥</m:t>
+                          </m:r>
+                          <m:r>
+                            <a:rPr lang="id-ID" i="1">
+                              <a:effectLst/>
+                              <a:latin typeface="Cambria Math" panose="02040503050406030204" pitchFamily="18" charset="0"/>
+                              <a:ea typeface="Calibri" panose="020F0502020204030204" pitchFamily="34" charset="0"/>
+                              <a:cs typeface="Times New Roman" panose="02020603050405020304" pitchFamily="18" charset="0"/>
+                            </a:rPr>
+                            <m:t>)</m:t>
+                          </m:r>
+                        </m:e>
+                      </m:func>
+                      <m:r>
+                        <a:rPr lang="id-ID" i="1">
+                          <a:effectLst/>
+                          <a:latin typeface="Cambria Math" panose="02040503050406030204" pitchFamily="18" charset="0"/>
+                          <a:ea typeface="Calibri" panose="020F0502020204030204" pitchFamily="34" charset="0"/>
+                          <a:cs typeface="Times New Roman" panose="02020603050405020304" pitchFamily="18" charset="0"/>
+                        </a:rPr>
+                        <m:t>−(</m:t>
+                      </m:r>
+                      <m:func>
+                        <m:funcPr>
+                          <m:ctrlPr>
+                            <a:rPr lang="id-ID" i="1">
+                              <a:effectLst/>
+                              <a:latin typeface="Cambria Math" panose="02040503050406030204" pitchFamily="18" charset="0"/>
+                              <a:ea typeface="Calibri" panose="020F0502020204030204" pitchFamily="34" charset="0"/>
+                              <a:cs typeface="Times New Roman" panose="02020603050405020304" pitchFamily="18" charset="0"/>
+                            </a:rPr>
+                          </m:ctrlPr>
+                        </m:funcPr>
+                        <m:fName>
+                          <m:r>
+                            <m:rPr>
+                              <m:sty m:val="p"/>
+                            </m:rPr>
+                            <a:rPr lang="id-ID">
+                              <a:effectLst/>
+                              <a:latin typeface="Cambria Math" panose="02040503050406030204" pitchFamily="18" charset="0"/>
+                              <a:ea typeface="Calibri" panose="020F0502020204030204" pitchFamily="34" charset="0"/>
+                              <a:cs typeface="Times New Roman" panose="02020603050405020304" pitchFamily="18" charset="0"/>
+                            </a:rPr>
+                            <m:t>tan</m:t>
+                          </m:r>
+                        </m:fName>
+                        <m:e>
+                          <m:r>
+                            <a:rPr lang="id-ID" i="1">
+                              <a:effectLst/>
+                              <a:latin typeface="Cambria Math" panose="02040503050406030204" pitchFamily="18" charset="0"/>
+                              <a:ea typeface="Calibri" panose="020F0502020204030204" pitchFamily="34" charset="0"/>
+                              <a:cs typeface="Times New Roman" panose="02020603050405020304" pitchFamily="18" charset="0"/>
+                            </a:rPr>
+                            <m:t>𝛽</m:t>
+                          </m:r>
+                          <m:r>
+                            <a:rPr lang="id-ID" i="1">
+                              <a:effectLst/>
+                              <a:latin typeface="Cambria Math" panose="02040503050406030204" pitchFamily="18" charset="0"/>
+                              <a:ea typeface="Calibri" panose="020F0502020204030204" pitchFamily="34" charset="0"/>
+                              <a:cs typeface="Times New Roman" panose="02020603050405020304" pitchFamily="18" charset="0"/>
+                            </a:rPr>
+                            <m:t> ×</m:t>
+                          </m:r>
+                        </m:e>
+                      </m:func>
+                      <m:r>
+                        <a:rPr lang="id-ID" i="1">
+                          <a:effectLst/>
+                          <a:latin typeface="Cambria Math" panose="02040503050406030204" pitchFamily="18" charset="0"/>
+                          <a:ea typeface="Calibri" panose="020F0502020204030204" pitchFamily="34" charset="0"/>
+                          <a:cs typeface="Times New Roman" panose="02020603050405020304" pitchFamily="18" charset="0"/>
+                        </a:rPr>
+                        <m:t>𝑥</m:t>
+                      </m:r>
+                      <m:r>
+                        <a:rPr lang="id-ID" i="1">
+                          <a:effectLst/>
+                          <a:latin typeface="Cambria Math" panose="02040503050406030204" pitchFamily="18" charset="0"/>
+                          <a:ea typeface="Calibri" panose="020F0502020204030204" pitchFamily="34" charset="0"/>
+                          <a:cs typeface="Times New Roman" panose="02020603050405020304" pitchFamily="18" charset="0"/>
+                        </a:rPr>
+                        <m:t>)</m:t>
+                      </m:r>
+                    </m:oMath>
+                  </m:oMathPara>
+                </a14:m>
+                <a:endParaRPr lang="id-ID" dirty="0">
+                  <a:effectLst/>
+                  <a:latin typeface="Calibri" panose="020F0502020204030204" pitchFamily="34" charset="0"/>
+                  <a:ea typeface="Calibri" panose="020F0502020204030204" pitchFamily="34" charset="0"/>
+                  <a:cs typeface="Times New Roman" panose="02020603050405020304" pitchFamily="18" charset="0"/>
+                </a:endParaRPr>
+              </a:p>
+              <a:p>
+                <a:pPr>
+                  <a:lnSpc>
+                    <a:spcPct val="107000"/>
+                  </a:lnSpc>
+                  <a:spcAft>
+                    <a:spcPts val="800"/>
+                  </a:spcAft>
+                </a:pPr>
+                <a14:m>
+                  <m:oMathPara xmlns:m="http://schemas.openxmlformats.org/officeDocument/2006/math">
+                    <m:oMathParaPr>
+                      <m:jc m:val="centerGroup"/>
+                    </m:oMathParaPr>
+                    <m:oMath xmlns:m="http://schemas.openxmlformats.org/officeDocument/2006/math">
+                      <m:r>
+                        <a:rPr lang="id-ID" i="1">
+                          <a:effectLst/>
+                          <a:latin typeface="Cambria Math" panose="02040503050406030204" pitchFamily="18" charset="0"/>
+                          <a:ea typeface="Times New Roman" panose="02020603050405020304" pitchFamily="18" charset="0"/>
+                          <a:cs typeface="Times New Roman" panose="02020603050405020304" pitchFamily="18" charset="0"/>
+                        </a:rPr>
+                        <m:t>𝑥</m:t>
+                      </m:r>
+                      <m:r>
+                        <a:rPr lang="id-ID" i="1">
+                          <a:effectLst/>
+                          <a:latin typeface="Cambria Math" panose="02040503050406030204" pitchFamily="18" charset="0"/>
+                          <a:ea typeface="Times New Roman" panose="02020603050405020304" pitchFamily="18" charset="0"/>
+                          <a:cs typeface="Times New Roman" panose="02020603050405020304" pitchFamily="18" charset="0"/>
+                        </a:rPr>
+                        <m:t>= </m:t>
+                      </m:r>
+                      <m:f>
+                        <m:fPr>
+                          <m:ctrlPr>
+                            <a:rPr lang="id-ID" i="1">
+                              <a:effectLst/>
+                              <a:latin typeface="Cambria Math" panose="02040503050406030204" pitchFamily="18" charset="0"/>
+                              <a:ea typeface="Times New Roman" panose="02020603050405020304" pitchFamily="18" charset="0"/>
+                              <a:cs typeface="Times New Roman" panose="02020603050405020304" pitchFamily="18" charset="0"/>
+                            </a:rPr>
+                          </m:ctrlPr>
+                        </m:fPr>
+                        <m:num>
+                          <m:func>
+                            <m:funcPr>
+                              <m:ctrlPr>
+                                <a:rPr lang="id-ID" i="1">
+                                  <a:effectLst/>
+                                  <a:latin typeface="Cambria Math" panose="02040503050406030204" pitchFamily="18" charset="0"/>
+                                  <a:ea typeface="Times New Roman" panose="02020603050405020304" pitchFamily="18" charset="0"/>
+                                  <a:cs typeface="Times New Roman" panose="02020603050405020304" pitchFamily="18" charset="0"/>
+                                </a:rPr>
+                              </m:ctrlPr>
+                            </m:funcPr>
+                            <m:fName>
+                              <m:r>
+                                <m:rPr>
+                                  <m:sty m:val="p"/>
+                                </m:rPr>
+                                <a:rPr lang="id-ID">
+                                  <a:effectLst/>
+                                  <a:latin typeface="Cambria Math" panose="02040503050406030204" pitchFamily="18" charset="0"/>
+                                  <a:ea typeface="Times New Roman" panose="02020603050405020304" pitchFamily="18" charset="0"/>
+                                  <a:cs typeface="Times New Roman" panose="02020603050405020304" pitchFamily="18" charset="0"/>
+                                </a:rPr>
+                                <m:t>tan</m:t>
+                              </m:r>
+                            </m:fName>
+                            <m:e>
+                              <m:r>
+                                <a:rPr lang="id-ID" i="1">
+                                  <a:effectLst/>
+                                  <a:latin typeface="Cambria Math" panose="02040503050406030204" pitchFamily="18" charset="0"/>
+                                  <a:ea typeface="Times New Roman" panose="02020603050405020304" pitchFamily="18" charset="0"/>
+                                  <a:cs typeface="Times New Roman" panose="02020603050405020304" pitchFamily="18" charset="0"/>
+                                </a:rPr>
+                                <m:t>𝛽</m:t>
+                              </m:r>
+                              <m:r>
+                                <a:rPr lang="id-ID" i="1">
+                                  <a:effectLst/>
+                                  <a:latin typeface="Cambria Math" panose="02040503050406030204" pitchFamily="18" charset="0"/>
+                                  <a:ea typeface="Times New Roman" panose="02020603050405020304" pitchFamily="18" charset="0"/>
+                                  <a:cs typeface="Times New Roman" panose="02020603050405020304" pitchFamily="18" charset="0"/>
+                                </a:rPr>
+                                <m:t>×</m:t>
+                              </m:r>
+                              <m:r>
+                                <a:rPr lang="id-ID" i="1">
+                                  <a:effectLst/>
+                                  <a:latin typeface="Cambria Math" panose="02040503050406030204" pitchFamily="18" charset="0"/>
+                                  <a:ea typeface="Times New Roman" panose="02020603050405020304" pitchFamily="18" charset="0"/>
+                                  <a:cs typeface="Times New Roman" panose="02020603050405020304" pitchFamily="18" charset="0"/>
+                                </a:rPr>
+                                <m:t>𝑑𝑖𝑠𝑡𝑎𝑛𝑐𝑒</m:t>
+                              </m:r>
+                            </m:e>
+                          </m:func>
+                        </m:num>
+                        <m:den>
+                          <m:func>
+                            <m:funcPr>
+                              <m:ctrlPr>
+                                <a:rPr lang="id-ID" i="1">
+                                  <a:effectLst/>
+                                  <a:latin typeface="Cambria Math" panose="02040503050406030204" pitchFamily="18" charset="0"/>
+                                  <a:ea typeface="Times New Roman" panose="02020603050405020304" pitchFamily="18" charset="0"/>
+                                  <a:cs typeface="Times New Roman" panose="02020603050405020304" pitchFamily="18" charset="0"/>
+                                </a:rPr>
+                              </m:ctrlPr>
+                            </m:funcPr>
+                            <m:fName>
+                              <m:r>
+                                <m:rPr>
+                                  <m:sty m:val="p"/>
+                                </m:rPr>
+                                <a:rPr lang="id-ID">
+                                  <a:effectLst/>
+                                  <a:latin typeface="Cambria Math" panose="02040503050406030204" pitchFamily="18" charset="0"/>
+                                  <a:ea typeface="Times New Roman" panose="02020603050405020304" pitchFamily="18" charset="0"/>
+                                  <a:cs typeface="Times New Roman" panose="02020603050405020304" pitchFamily="18" charset="0"/>
+                                </a:rPr>
+                                <m:t>tan</m:t>
+                              </m:r>
+                            </m:fName>
+                            <m:e>
+                              <m:r>
+                                <a:rPr lang="id-ID" i="1">
+                                  <a:effectLst/>
+                                  <a:latin typeface="Cambria Math" panose="02040503050406030204" pitchFamily="18" charset="0"/>
+                                  <a:ea typeface="Times New Roman" panose="02020603050405020304" pitchFamily="18" charset="0"/>
+                                  <a:cs typeface="Times New Roman" panose="02020603050405020304" pitchFamily="18" charset="0"/>
+                                </a:rPr>
+                                <m:t>𝛼</m:t>
+                              </m:r>
+                              <m:r>
+                                <a:rPr lang="id-ID" i="1">
+                                  <a:effectLst/>
+                                  <a:latin typeface="Cambria Math" panose="02040503050406030204" pitchFamily="18" charset="0"/>
+                                  <a:ea typeface="Times New Roman" panose="02020603050405020304" pitchFamily="18" charset="0"/>
+                                  <a:cs typeface="Times New Roman" panose="02020603050405020304" pitchFamily="18" charset="0"/>
+                                </a:rPr>
+                                <m:t>+</m:t>
+                              </m:r>
+                              <m:func>
+                                <m:funcPr>
+                                  <m:ctrlPr>
+                                    <a:rPr lang="id-ID" i="1">
+                                      <a:effectLst/>
+                                      <a:latin typeface="Cambria Math" panose="02040503050406030204" pitchFamily="18" charset="0"/>
+                                      <a:ea typeface="Times New Roman" panose="02020603050405020304" pitchFamily="18" charset="0"/>
+                                      <a:cs typeface="Times New Roman" panose="02020603050405020304" pitchFamily="18" charset="0"/>
+                                    </a:rPr>
+                                  </m:ctrlPr>
+                                </m:funcPr>
+                                <m:fName>
+                                  <m:r>
+                                    <m:rPr>
+                                      <m:sty m:val="p"/>
+                                    </m:rPr>
+                                    <a:rPr lang="id-ID">
+                                      <a:effectLst/>
+                                      <a:latin typeface="Cambria Math" panose="02040503050406030204" pitchFamily="18" charset="0"/>
+                                      <a:ea typeface="Times New Roman" panose="02020603050405020304" pitchFamily="18" charset="0"/>
+                                      <a:cs typeface="Times New Roman" panose="02020603050405020304" pitchFamily="18" charset="0"/>
+                                    </a:rPr>
+                                    <m:t>tan</m:t>
+                                  </m:r>
+                                </m:fName>
+                                <m:e>
+                                  <m:r>
+                                    <a:rPr lang="id-ID" i="1">
+                                      <a:effectLst/>
+                                      <a:latin typeface="Cambria Math" panose="02040503050406030204" pitchFamily="18" charset="0"/>
+                                      <a:ea typeface="Times New Roman" panose="02020603050405020304" pitchFamily="18" charset="0"/>
+                                      <a:cs typeface="Times New Roman" panose="02020603050405020304" pitchFamily="18" charset="0"/>
+                                    </a:rPr>
+                                    <m:t>𝛽</m:t>
+                                  </m:r>
+                                </m:e>
+                              </m:func>
+                            </m:e>
+                          </m:func>
+                        </m:den>
+                      </m:f>
+                    </m:oMath>
+                  </m:oMathPara>
+                </a14:m>
+                <a:endParaRPr lang="id-ID" dirty="0">
+                  <a:effectLst/>
+                  <a:latin typeface="Calibri" panose="020F0502020204030204" pitchFamily="34" charset="0"/>
+                  <a:ea typeface="Calibri" panose="020F0502020204030204" pitchFamily="34" charset="0"/>
+                  <a:cs typeface="Times New Roman" panose="02020603050405020304" pitchFamily="18" charset="0"/>
+                </a:endParaRPr>
+              </a:p>
+            </p:txBody>
+          </p:sp>
+        </mc:Choice>
+        <mc:Fallback>
+          <p:sp>
+            <p:nvSpPr>
+              <p:cNvPr id="7" name="Rectangle 6"/>
+              <p:cNvSpPr>
+                <a:spLocks noRot="1" noChangeAspect="1" noMove="1" noResize="1" noEditPoints="1" noAdjustHandles="1" noChangeArrowheads="1" noChangeShapeType="1" noTextEdit="1"/>
+              </p:cNvSpPr>
+              <p:nvPr/>
+            </p:nvSpPr>
+            <p:spPr>
+              <a:xfrm>
+                <a:off x="5801233" y="2377860"/>
+                <a:ext cx="6096000" cy="2004523"/>
+              </a:xfrm>
+              <a:prstGeom prst="rect">
+                <a:avLst/>
+              </a:prstGeom>
+              <a:blipFill rotWithShape="0">
+                <a:blip r:embed="rId3"/>
+                <a:stretch>
+                  <a:fillRect/>
+                </a:stretch>
+              </a:blipFill>
+            </p:spPr>
+            <p:txBody>
+              <a:bodyPr/>
+              <a:lstStyle/>
+              <a:p>
+                <a:r>
+                  <a:rPr lang="id-ID">
+                    <a:noFill/>
+                  </a:rPr>
+                  <a:t> </a:t>
+                </a:r>
+              </a:p>
+            </p:txBody>
+          </p:sp>
+        </mc:Fallback>
+      </mc:AlternateContent>
+    </p:spTree>
+    <p:extLst>
+      <p:ext uri="{BB962C8B-B14F-4D97-AF65-F5344CB8AC3E}">
+        <p14:creationId xmlns:p14="http://schemas.microsoft.com/office/powerpoint/2010/main" val="3320040683"/>
+      </p:ext>
+    </p:extLst>
+  </p:cSld>
+  <p:clrMapOvr>
+    <a:masterClrMapping/>
+  </p:clrMapOvr>
+</p:sld>
+</file>
+
+<file path=ppt/slides/slide16.xml><?xml version="1.0" encoding="utf-8"?>
+<p:sld xmlns:a="http://schemas.openxmlformats.org/drawingml/2006/main" xmlns:r="http://schemas.openxmlformats.org/officeDocument/2006/relationships" xmlns:p="http://schemas.openxmlformats.org/presentationml/2006/main">
+  <p:cSld>
+    <p:spTree>
+      <p:nvGrpSpPr>
+        <p:cNvPr id="1" name=""/>
+        <p:cNvGrpSpPr/>
+        <p:nvPr/>
+      </p:nvGrpSpPr>
+      <p:grpSpPr>
+        <a:xfrm>
+          <a:off x="0" y="0"/>
+          <a:ext cx="0" cy="0"/>
+          <a:chOff x="0" y="0"/>
+          <a:chExt cx="0" cy="0"/>
+        </a:xfrm>
+      </p:grpSpPr>
+      <p:sp>
+        <p:nvSpPr>
+          <p:cNvPr id="2" name="Title 1"/>
+          <p:cNvSpPr>
+            <a:spLocks noGrp="1"/>
+          </p:cNvSpPr>
+          <p:nvPr>
+            <p:ph type="title"/>
+          </p:nvPr>
+        </p:nvSpPr>
+        <p:spPr>
+          <a:xfrm>
+            <a:off x="1141413" y="618518"/>
+            <a:ext cx="9905998" cy="992568"/>
+          </a:xfrm>
+        </p:spPr>
+        <p:txBody>
+          <a:bodyPr/>
+          <a:lstStyle/>
+          <a:p>
+            <a:pPr algn="r"/>
+            <a:r>
+              <a:rPr lang="id-ID" dirty="0" smtClean="0"/>
+              <a:t>Model sistem (sumbu z)</a:t>
+            </a:r>
+            <a:endParaRPr lang="id-ID" dirty="0"/>
+          </a:p>
+        </p:txBody>
+      </p:sp>
+      <p:pic>
+        <p:nvPicPr>
+          <p:cNvPr id="4" name="Picture 3"/>
+          <p:cNvPicPr>
+            <a:picLocks noChangeAspect="1"/>
+          </p:cNvPicPr>
+          <p:nvPr/>
+        </p:nvPicPr>
+        <p:blipFill>
+          <a:blip r:embed="rId2"/>
+          <a:stretch>
+            <a:fillRect/>
+          </a:stretch>
+        </p:blipFill>
+        <p:spPr>
+          <a:xfrm>
+            <a:off x="1141413" y="1611086"/>
+            <a:ext cx="7086600" cy="3128963"/>
+          </a:xfrm>
+          <a:prstGeom prst="rect">
+            <a:avLst/>
+          </a:prstGeom>
+        </p:spPr>
+      </p:pic>
+      <mc:AlternateContent xmlns:mc="http://schemas.openxmlformats.org/markup-compatibility/2006">
+        <mc:Choice xmlns:a14="http://schemas.microsoft.com/office/drawing/2010/main" Requires="a14">
+          <p:sp>
+            <p:nvSpPr>
+              <p:cNvPr id="5" name="Rectangle 4"/>
+              <p:cNvSpPr/>
+              <p:nvPr/>
+            </p:nvSpPr>
+            <p:spPr>
+              <a:xfrm>
+                <a:off x="6736670" y="2199446"/>
+                <a:ext cx="6096000" cy="1553630"/>
+              </a:xfrm>
+              <a:prstGeom prst="rect">
+                <a:avLst/>
+              </a:prstGeom>
+            </p:spPr>
+            <p:txBody>
+              <a:bodyPr>
+                <a:spAutoFit/>
+              </a:bodyPr>
+              <a:lstStyle/>
+              <a:p>
+                <a:pPr algn="ctr">
+                  <a:lnSpc>
+                    <a:spcPct val="107000"/>
+                  </a:lnSpc>
+                  <a:spcAft>
+                    <a:spcPts val="800"/>
+                  </a:spcAft>
+                </a:pPr>
+                <a14:m>
+                  <m:oMathPara xmlns:m="http://schemas.openxmlformats.org/officeDocument/2006/math">
+                    <m:oMathParaPr>
+                      <m:jc m:val="centerGroup"/>
+                    </m:oMathParaPr>
+                    <m:oMath xmlns:m="http://schemas.openxmlformats.org/officeDocument/2006/math">
+                      <m:func>
+                        <m:funcPr>
+                          <m:ctrlPr>
+                            <a:rPr lang="id-ID" i="1">
+                              <a:latin typeface="Cambria Math" panose="02040503050406030204" pitchFamily="18" charset="0"/>
+                              <a:ea typeface="Times New Roman" panose="02020603050405020304" pitchFamily="18" charset="0"/>
+                              <a:cs typeface="Times New Roman" panose="02020603050405020304" pitchFamily="18" charset="0"/>
+                            </a:rPr>
+                          </m:ctrlPr>
+                        </m:funcPr>
+                        <m:fName>
+                          <m:r>
+                            <m:rPr>
+                              <m:sty m:val="p"/>
+                            </m:rPr>
+                            <a:rPr lang="id-ID">
+                              <a:effectLst/>
+                              <a:latin typeface="Cambria Math" panose="02040503050406030204" pitchFamily="18" charset="0"/>
+                              <a:ea typeface="Times New Roman" panose="02020603050405020304" pitchFamily="18" charset="0"/>
+                              <a:cs typeface="Times New Roman" panose="02020603050405020304" pitchFamily="18" charset="0"/>
+                            </a:rPr>
+                            <m:t>tan</m:t>
+                          </m:r>
+                        </m:fName>
+                        <m:e>
+                          <m:r>
+                            <a:rPr lang="id-ID" i="1">
+                              <a:effectLst/>
+                              <a:latin typeface="Cambria Math" panose="02040503050406030204" pitchFamily="18" charset="0"/>
+                              <a:ea typeface="Times New Roman" panose="02020603050405020304" pitchFamily="18" charset="0"/>
+                              <a:cs typeface="Times New Roman" panose="02020603050405020304" pitchFamily="18" charset="0"/>
+                            </a:rPr>
+                            <m:t>𝛼</m:t>
+                          </m:r>
+                          <m:r>
+                            <a:rPr lang="id-ID" i="1">
+                              <a:effectLst/>
+                              <a:latin typeface="Cambria Math" panose="02040503050406030204" pitchFamily="18" charset="0"/>
+                              <a:ea typeface="Times New Roman" panose="02020603050405020304" pitchFamily="18" charset="0"/>
+                              <a:cs typeface="Times New Roman" panose="02020603050405020304" pitchFamily="18" charset="0"/>
+                            </a:rPr>
+                            <m:t>= </m:t>
+                          </m:r>
+                          <m:f>
+                            <m:fPr>
+                              <m:ctrlPr>
+                                <a:rPr lang="id-ID" i="1">
+                                  <a:effectLst/>
+                                  <a:latin typeface="Cambria Math" panose="02040503050406030204" pitchFamily="18" charset="0"/>
+                                  <a:ea typeface="Times New Roman" panose="02020603050405020304" pitchFamily="18" charset="0"/>
+                                  <a:cs typeface="Times New Roman" panose="02020603050405020304" pitchFamily="18" charset="0"/>
+                                </a:rPr>
+                              </m:ctrlPr>
+                            </m:fPr>
+                            <m:num>
+                              <m:r>
+                                <a:rPr lang="id-ID" i="1">
+                                  <a:effectLst/>
+                                  <a:latin typeface="Cambria Math" panose="02040503050406030204" pitchFamily="18" charset="0"/>
+                                  <a:ea typeface="Times New Roman" panose="02020603050405020304" pitchFamily="18" charset="0"/>
+                                  <a:cs typeface="Times New Roman" panose="02020603050405020304" pitchFamily="18" charset="0"/>
+                                </a:rPr>
+                                <m:t>h</m:t>
+                              </m:r>
+                            </m:num>
+                            <m:den>
+                              <m:r>
+                                <a:rPr lang="id-ID" i="1">
+                                  <a:effectLst/>
+                                  <a:latin typeface="Cambria Math" panose="02040503050406030204" pitchFamily="18" charset="0"/>
+                                  <a:ea typeface="Times New Roman" panose="02020603050405020304" pitchFamily="18" charset="0"/>
+                                  <a:cs typeface="Times New Roman" panose="02020603050405020304" pitchFamily="18" charset="0"/>
+                                </a:rPr>
+                                <m:t>𝑟</m:t>
+                              </m:r>
+                            </m:den>
+                          </m:f>
+                        </m:e>
+                      </m:func>
+                    </m:oMath>
+                  </m:oMathPara>
+                </a14:m>
+                <a:endParaRPr lang="id-ID" dirty="0">
+                  <a:effectLst/>
+                  <a:latin typeface="Calibri" panose="020F0502020204030204" pitchFamily="34" charset="0"/>
+                  <a:ea typeface="Calibri" panose="020F0502020204030204" pitchFamily="34" charset="0"/>
+                  <a:cs typeface="Times New Roman" panose="02020603050405020304" pitchFamily="18" charset="0"/>
+                </a:endParaRPr>
+              </a:p>
+              <a:p>
+                <a:pPr algn="ctr">
+                  <a:lnSpc>
+                    <a:spcPct val="107000"/>
+                  </a:lnSpc>
+                  <a:spcAft>
+                    <a:spcPts val="800"/>
+                  </a:spcAft>
+                </a:pPr>
+                <a14:m>
+                  <m:oMathPara xmlns:m="http://schemas.openxmlformats.org/officeDocument/2006/math">
+                    <m:oMathParaPr>
+                      <m:jc m:val="centerGroup"/>
+                    </m:oMathParaPr>
+                    <m:oMath xmlns:m="http://schemas.openxmlformats.org/officeDocument/2006/math">
+                      <m:r>
+                        <a:rPr lang="id-ID" i="1">
+                          <a:effectLst/>
+                          <a:latin typeface="Cambria Math" panose="02040503050406030204" pitchFamily="18" charset="0"/>
+                          <a:ea typeface="Times New Roman" panose="02020603050405020304" pitchFamily="18" charset="0"/>
+                          <a:cs typeface="Times New Roman" panose="02020603050405020304" pitchFamily="18" charset="0"/>
+                        </a:rPr>
+                        <m:t>h</m:t>
+                      </m:r>
+                      <m:r>
+                        <a:rPr lang="id-ID" i="1">
+                          <a:effectLst/>
+                          <a:latin typeface="Cambria Math" panose="02040503050406030204" pitchFamily="18" charset="0"/>
+                          <a:ea typeface="Times New Roman" panose="02020603050405020304" pitchFamily="18" charset="0"/>
+                          <a:cs typeface="Times New Roman" panose="02020603050405020304" pitchFamily="18" charset="0"/>
+                        </a:rPr>
+                        <m:t>=</m:t>
+                      </m:r>
+                      <m:r>
+                        <a:rPr lang="id-ID" i="1">
+                          <a:effectLst/>
+                          <a:latin typeface="Cambria Math" panose="02040503050406030204" pitchFamily="18" charset="0"/>
+                          <a:ea typeface="Times New Roman" panose="02020603050405020304" pitchFamily="18" charset="0"/>
+                          <a:cs typeface="Times New Roman" panose="02020603050405020304" pitchFamily="18" charset="0"/>
+                        </a:rPr>
+                        <m:t>𝑟</m:t>
+                      </m:r>
+                      <m:r>
+                        <a:rPr lang="id-ID" i="1">
+                          <a:effectLst/>
+                          <a:latin typeface="Cambria Math" panose="02040503050406030204" pitchFamily="18" charset="0"/>
+                          <a:ea typeface="Times New Roman" panose="02020603050405020304" pitchFamily="18" charset="0"/>
+                          <a:cs typeface="Times New Roman" panose="02020603050405020304" pitchFamily="18" charset="0"/>
+                        </a:rPr>
+                        <m:t> ×</m:t>
+                      </m:r>
+                      <m:func>
+                        <m:funcPr>
+                          <m:ctrlPr>
+                            <a:rPr lang="id-ID" i="1">
+                              <a:effectLst/>
+                              <a:latin typeface="Cambria Math" panose="02040503050406030204" pitchFamily="18" charset="0"/>
+                              <a:ea typeface="Times New Roman" panose="02020603050405020304" pitchFamily="18" charset="0"/>
+                              <a:cs typeface="Times New Roman" panose="02020603050405020304" pitchFamily="18" charset="0"/>
+                            </a:rPr>
+                          </m:ctrlPr>
+                        </m:funcPr>
+                        <m:fName>
+                          <m:r>
+                            <m:rPr>
+                              <m:sty m:val="p"/>
+                            </m:rPr>
+                            <a:rPr lang="id-ID">
+                              <a:effectLst/>
+                              <a:latin typeface="Cambria Math" panose="02040503050406030204" pitchFamily="18" charset="0"/>
+                              <a:ea typeface="Times New Roman" panose="02020603050405020304" pitchFamily="18" charset="0"/>
+                              <a:cs typeface="Times New Roman" panose="02020603050405020304" pitchFamily="18" charset="0"/>
+                            </a:rPr>
+                            <m:t>tan</m:t>
+                          </m:r>
+                        </m:fName>
+                        <m:e>
+                          <m:r>
+                            <a:rPr lang="id-ID" i="1">
+                              <a:effectLst/>
+                              <a:latin typeface="Cambria Math" panose="02040503050406030204" pitchFamily="18" charset="0"/>
+                              <a:ea typeface="Times New Roman" panose="02020603050405020304" pitchFamily="18" charset="0"/>
+                              <a:cs typeface="Times New Roman" panose="02020603050405020304" pitchFamily="18" charset="0"/>
+                            </a:rPr>
+                            <m:t>𝛼</m:t>
+                          </m:r>
+                        </m:e>
+                      </m:func>
+                    </m:oMath>
+                  </m:oMathPara>
+                </a14:m>
+                <a:endParaRPr lang="id-ID" dirty="0">
+                  <a:effectLst/>
+                  <a:latin typeface="Calibri" panose="020F0502020204030204" pitchFamily="34" charset="0"/>
+                  <a:ea typeface="Calibri" panose="020F0502020204030204" pitchFamily="34" charset="0"/>
+                  <a:cs typeface="Times New Roman" panose="02020603050405020304" pitchFamily="18" charset="0"/>
+                </a:endParaRPr>
+              </a:p>
+              <a:p>
+                <a:pPr algn="ctr">
+                  <a:lnSpc>
+                    <a:spcPct val="107000"/>
+                  </a:lnSpc>
+                  <a:spcAft>
+                    <a:spcPts val="800"/>
+                  </a:spcAft>
+                </a:pPr>
+                <a14:m>
+                  <m:oMathPara xmlns:m="http://schemas.openxmlformats.org/officeDocument/2006/math">
+                    <m:oMathParaPr>
+                      <m:jc m:val="centerGroup"/>
+                    </m:oMathParaPr>
+                    <m:oMath xmlns:m="http://schemas.openxmlformats.org/officeDocument/2006/math">
+                      <m:r>
+                        <a:rPr lang="id-ID" i="1">
+                          <a:effectLst/>
+                          <a:latin typeface="Cambria Math" panose="02040503050406030204" pitchFamily="18" charset="0"/>
+                          <a:ea typeface="Times New Roman" panose="02020603050405020304" pitchFamily="18" charset="0"/>
+                          <a:cs typeface="Times New Roman" panose="02020603050405020304" pitchFamily="18" charset="0"/>
+                        </a:rPr>
+                        <m:t>𝑧</m:t>
+                      </m:r>
+                      <m:r>
+                        <a:rPr lang="id-ID" i="1">
+                          <a:effectLst/>
+                          <a:latin typeface="Cambria Math" panose="02040503050406030204" pitchFamily="18" charset="0"/>
+                          <a:ea typeface="Times New Roman" panose="02020603050405020304" pitchFamily="18" charset="0"/>
+                          <a:cs typeface="Times New Roman" panose="02020603050405020304" pitchFamily="18" charset="0"/>
+                        </a:rPr>
+                        <m:t>=</m:t>
+                      </m:r>
+                      <m:r>
+                        <a:rPr lang="id-ID" i="1">
+                          <a:effectLst/>
+                          <a:latin typeface="Cambria Math" panose="02040503050406030204" pitchFamily="18" charset="0"/>
+                          <a:ea typeface="Times New Roman" panose="02020603050405020304" pitchFamily="18" charset="0"/>
+                          <a:cs typeface="Times New Roman" panose="02020603050405020304" pitchFamily="18" charset="0"/>
+                        </a:rPr>
+                        <m:t>𝑡𝑖𝑛𝑔𝑔𝑖</m:t>
+                      </m:r>
+                      <m:r>
+                        <a:rPr lang="id-ID" i="1">
+                          <a:effectLst/>
+                          <a:latin typeface="Cambria Math" panose="02040503050406030204" pitchFamily="18" charset="0"/>
+                          <a:ea typeface="Times New Roman" panose="02020603050405020304" pitchFamily="18" charset="0"/>
+                          <a:cs typeface="Times New Roman" panose="02020603050405020304" pitchFamily="18" charset="0"/>
+                        </a:rPr>
+                        <m:t> </m:t>
+                      </m:r>
+                      <m:r>
+                        <a:rPr lang="id-ID" i="1">
+                          <a:effectLst/>
+                          <a:latin typeface="Cambria Math" panose="02040503050406030204" pitchFamily="18" charset="0"/>
+                          <a:ea typeface="Times New Roman" panose="02020603050405020304" pitchFamily="18" charset="0"/>
+                          <a:cs typeface="Times New Roman" panose="02020603050405020304" pitchFamily="18" charset="0"/>
+                        </a:rPr>
+                        <m:t>𝑘𝑎𝑚𝑒𝑟𝑎</m:t>
+                      </m:r>
+                      <m:r>
+                        <a:rPr lang="id-ID" i="1">
+                          <a:effectLst/>
+                          <a:latin typeface="Cambria Math" panose="02040503050406030204" pitchFamily="18" charset="0"/>
+                          <a:ea typeface="Times New Roman" panose="02020603050405020304" pitchFamily="18" charset="0"/>
+                          <a:cs typeface="Times New Roman" panose="02020603050405020304" pitchFamily="18" charset="0"/>
+                        </a:rPr>
+                        <m:t>±</m:t>
+                      </m:r>
+                      <m:r>
+                        <a:rPr lang="id-ID" i="1">
+                          <a:effectLst/>
+                          <a:latin typeface="Cambria Math" panose="02040503050406030204" pitchFamily="18" charset="0"/>
+                          <a:ea typeface="Times New Roman" panose="02020603050405020304" pitchFamily="18" charset="0"/>
+                          <a:cs typeface="Times New Roman" panose="02020603050405020304" pitchFamily="18" charset="0"/>
+                        </a:rPr>
+                        <m:t>h</m:t>
+                      </m:r>
+                    </m:oMath>
+                  </m:oMathPara>
+                </a14:m>
+                <a:endParaRPr lang="id-ID" dirty="0">
+                  <a:effectLst/>
+                  <a:latin typeface="Calibri" panose="020F0502020204030204" pitchFamily="34" charset="0"/>
+                  <a:ea typeface="Calibri" panose="020F0502020204030204" pitchFamily="34" charset="0"/>
+                  <a:cs typeface="Times New Roman" panose="02020603050405020304" pitchFamily="18" charset="0"/>
+                </a:endParaRPr>
+              </a:p>
+            </p:txBody>
+          </p:sp>
+        </mc:Choice>
+        <mc:Fallback>
+          <p:sp>
+            <p:nvSpPr>
+              <p:cNvPr id="5" name="Rectangle 4"/>
+              <p:cNvSpPr>
+                <a:spLocks noRot="1" noChangeAspect="1" noMove="1" noResize="1" noEditPoints="1" noAdjustHandles="1" noChangeArrowheads="1" noChangeShapeType="1" noTextEdit="1"/>
+              </p:cNvSpPr>
+              <p:nvPr/>
+            </p:nvSpPr>
+            <p:spPr>
+              <a:xfrm>
+                <a:off x="6736670" y="2199446"/>
+                <a:ext cx="6096000" cy="1553630"/>
+              </a:xfrm>
+              <a:prstGeom prst="rect">
+                <a:avLst/>
+              </a:prstGeom>
+              <a:blipFill rotWithShape="0">
+                <a:blip r:embed="rId3"/>
+                <a:stretch>
+                  <a:fillRect/>
+                </a:stretch>
+              </a:blipFill>
+            </p:spPr>
+            <p:txBody>
+              <a:bodyPr/>
+              <a:lstStyle/>
+              <a:p>
+                <a:r>
+                  <a:rPr lang="id-ID">
+                    <a:noFill/>
+                  </a:rPr>
+                  <a:t> </a:t>
+                </a:r>
+              </a:p>
+            </p:txBody>
+          </p:sp>
+        </mc:Fallback>
+      </mc:AlternateContent>
+    </p:spTree>
+    <p:extLst>
+      <p:ext uri="{BB962C8B-B14F-4D97-AF65-F5344CB8AC3E}">
+        <p14:creationId xmlns:p14="http://schemas.microsoft.com/office/powerpoint/2010/main" val="643554090"/>
+      </p:ext>
+    </p:extLst>
+  </p:cSld>
+  <p:clrMapOvr>
+    <a:masterClrMapping/>
+  </p:clrMapOvr>
+</p:sld>
+</file>
+
+<file path=ppt/slides/slide17.xml><?xml version="1.0" encoding="utf-8"?>
+<p:sld xmlns:a="http://schemas.openxmlformats.org/drawingml/2006/main" xmlns:r="http://schemas.openxmlformats.org/officeDocument/2006/relationships" xmlns:p="http://schemas.openxmlformats.org/presentationml/2006/main">
+  <p:cSld>
+    <p:spTree>
+      <p:nvGrpSpPr>
+        <p:cNvPr id="1" name=""/>
+        <p:cNvGrpSpPr/>
+        <p:nvPr/>
+      </p:nvGrpSpPr>
+      <p:grpSpPr>
+        <a:xfrm>
+          <a:off x="0" y="0"/>
+          <a:ext cx="0" cy="0"/>
+          <a:chOff x="0" y="0"/>
+          <a:chExt cx="0" cy="0"/>
+        </a:xfrm>
+      </p:grpSpPr>
+      <p:sp>
+        <p:nvSpPr>
+          <p:cNvPr id="2" name="Title 1"/>
+          <p:cNvSpPr>
+            <a:spLocks noGrp="1"/>
+          </p:cNvSpPr>
+          <p:nvPr>
+            <p:ph type="title"/>
+          </p:nvPr>
+        </p:nvSpPr>
         <p:spPr/>
         <p:txBody>
           <a:bodyPr/>
@@ -16103,7 +17092,7 @@
 </p:sld>
 </file>
 
-<file path=ppt/slides/slide16.xml><?xml version="1.0" encoding="utf-8"?>
+<file path=ppt/slides/slide18.xml><?xml version="1.0" encoding="utf-8"?>
 <p:sld xmlns:a="http://schemas.openxmlformats.org/drawingml/2006/main" xmlns:r="http://schemas.openxmlformats.org/officeDocument/2006/relationships" xmlns:p="http://schemas.openxmlformats.org/presentationml/2006/main">
   <p:cSld>
     <p:spTree>
@@ -16268,7 +17257,7 @@
 </p:sld>
 </file>
 
-<file path=ppt/slides/slide17.xml><?xml version="1.0" encoding="utf-8"?>
+<file path=ppt/slides/slide19.xml><?xml version="1.0" encoding="utf-8"?>
 <p:sld xmlns:a="http://schemas.openxmlformats.org/drawingml/2006/main" xmlns:r="http://schemas.openxmlformats.org/officeDocument/2006/relationships" xmlns:p="http://schemas.openxmlformats.org/presentationml/2006/main">
   <p:cSld>
     <p:spTree>
@@ -16438,333 +17427,6 @@
 </p:sld>
 </file>
 
-<file path=ppt/slides/slide18.xml><?xml version="1.0" encoding="utf-8"?>
-<p:sld xmlns:a="http://schemas.openxmlformats.org/drawingml/2006/main" xmlns:r="http://schemas.openxmlformats.org/officeDocument/2006/relationships" xmlns:p="http://schemas.openxmlformats.org/presentationml/2006/main">
-  <p:cSld>
-    <p:spTree>
-      <p:nvGrpSpPr>
-        <p:cNvPr id="1" name=""/>
-        <p:cNvGrpSpPr/>
-        <p:nvPr/>
-      </p:nvGrpSpPr>
-      <p:grpSpPr>
-        <a:xfrm>
-          <a:off x="0" y="0"/>
-          <a:ext cx="0" cy="0"/>
-          <a:chOff x="0" y="0"/>
-          <a:chExt cx="0" cy="0"/>
-        </a:xfrm>
-      </p:grpSpPr>
-      <p:sp>
-        <p:nvSpPr>
-          <p:cNvPr id="2" name="Title 1"/>
-          <p:cNvSpPr>
-            <a:spLocks noGrp="1"/>
-          </p:cNvSpPr>
-          <p:nvPr>
-            <p:ph type="title"/>
-          </p:nvPr>
-        </p:nvSpPr>
-        <p:spPr/>
-        <p:txBody>
-          <a:bodyPr/>
-          <a:lstStyle/>
-          <a:p>
-            <a:pPr algn="r"/>
-            <a:r>
-              <a:rPr lang="id-ID" dirty="0" smtClean="0"/>
-              <a:t>kesimpulan</a:t>
-            </a:r>
-            <a:endParaRPr lang="id-ID" dirty="0"/>
-          </a:p>
-        </p:txBody>
-      </p:sp>
-      <p:sp>
-        <p:nvSpPr>
-          <p:cNvPr id="3" name="Content Placeholder 2"/>
-          <p:cNvSpPr>
-            <a:spLocks noGrp="1"/>
-          </p:cNvSpPr>
-          <p:nvPr>
-            <p:ph idx="1"/>
-          </p:nvPr>
-        </p:nvSpPr>
-        <p:spPr/>
-        <p:txBody>
-          <a:bodyPr/>
-          <a:lstStyle/>
-          <a:p>
-            <a:pPr lvl="0"/>
-            <a:r>
-              <a:rPr lang="id-ID" dirty="0"/>
-              <a:t>A</a:t>
-            </a:r>
-            <a:r>
-              <a:rPr lang="en-US" dirty="0" err="1"/>
-              <a:t>lat</a:t>
-            </a:r>
-            <a:r>
-              <a:rPr lang="id-ID" dirty="0"/>
-              <a:t>/sistem ini</a:t>
-            </a:r>
-            <a:r>
-              <a:rPr lang="en-US" dirty="0"/>
-              <a:t> </a:t>
-            </a:r>
-            <a:r>
-              <a:rPr lang="en-US" dirty="0" err="1"/>
-              <a:t>mampu</a:t>
-            </a:r>
-            <a:r>
-              <a:rPr lang="en-US" dirty="0"/>
-              <a:t> men</a:t>
-            </a:r>
-            <a:r>
-              <a:rPr lang="id-ID" dirty="0"/>
-              <a:t>deteksi posisi shuttle cock pada bidang tiga dimensi</a:t>
-            </a:r>
-            <a:r>
-              <a:rPr lang="en-US" dirty="0"/>
-              <a:t>.</a:t>
-            </a:r>
-            <a:endParaRPr lang="id-ID" dirty="0"/>
-          </a:p>
-          <a:p>
-            <a:pPr lvl="0"/>
-            <a:r>
-              <a:rPr lang="id-ID" dirty="0"/>
-              <a:t>Secara teoritis, tingkat reliabilitas</a:t>
-            </a:r>
-            <a:r>
-              <a:rPr lang="en-US" dirty="0"/>
-              <a:t> </a:t>
-            </a:r>
-            <a:r>
-              <a:rPr lang="en-US" dirty="0" err="1"/>
-              <a:t>dan</a:t>
-            </a:r>
-            <a:r>
-              <a:rPr lang="id-ID" dirty="0"/>
-              <a:t> tingkat</a:t>
-            </a:r>
-            <a:r>
-              <a:rPr lang="en-US" dirty="0"/>
-              <a:t> </a:t>
-            </a:r>
-            <a:r>
-              <a:rPr lang="en-US" dirty="0" err="1"/>
-              <a:t>keakuratan</a:t>
-            </a:r>
-            <a:r>
-              <a:rPr lang="en-US" dirty="0"/>
-              <a:t> </a:t>
-            </a:r>
-            <a:r>
-              <a:rPr lang="en-US" dirty="0" err="1"/>
-              <a:t>alat</a:t>
-            </a:r>
-            <a:r>
-              <a:rPr lang="id-ID" dirty="0"/>
-              <a:t>/sistem</a:t>
-            </a:r>
-            <a:r>
-              <a:rPr lang="en-US" dirty="0"/>
-              <a:t> yang </a:t>
-            </a:r>
-            <a:r>
-              <a:rPr lang="en-US" dirty="0" err="1"/>
-              <a:t>dibuat</a:t>
-            </a:r>
-            <a:r>
-              <a:rPr lang="id-ID" dirty="0"/>
-              <a:t> dalam mendeteksi posisi shuttle cock cukup baik.</a:t>
-            </a:r>
-          </a:p>
-          <a:p>
-            <a:r>
-              <a:rPr lang="en-US" dirty="0" err="1"/>
-              <a:t>Algoritma</a:t>
-            </a:r>
-            <a:r>
-              <a:rPr lang="en-US" dirty="0"/>
-              <a:t> </a:t>
-            </a:r>
-            <a:r>
-              <a:rPr lang="en-US" dirty="0" err="1"/>
-              <a:t>kombinasi</a:t>
-            </a:r>
-            <a:r>
-              <a:rPr lang="en-US" dirty="0"/>
-              <a:t> </a:t>
-            </a:r>
-            <a:r>
-              <a:rPr lang="en-US" dirty="0" err="1"/>
-              <a:t>dari</a:t>
-            </a:r>
-            <a:r>
-              <a:rPr lang="en-US" dirty="0"/>
-              <a:t> background </a:t>
-            </a:r>
-            <a:r>
-              <a:rPr lang="en-US" dirty="0" err="1"/>
-              <a:t>substraction</a:t>
-            </a:r>
-            <a:r>
-              <a:rPr lang="en-US" dirty="0"/>
-              <a:t>, optical flow, color </a:t>
-            </a:r>
-            <a:r>
-              <a:rPr lang="en-US" dirty="0" err="1"/>
-              <a:t>thresholding</a:t>
-            </a:r>
-            <a:r>
-              <a:rPr lang="en-US" dirty="0"/>
-              <a:t>, </a:t>
-            </a:r>
-            <a:r>
-              <a:rPr lang="en-US" dirty="0" err="1"/>
-              <a:t>dan</a:t>
-            </a:r>
-            <a:r>
-              <a:rPr lang="en-US" dirty="0"/>
-              <a:t> </a:t>
-            </a:r>
-            <a:r>
-              <a:rPr lang="en-US" dirty="0" err="1"/>
-              <a:t>epipolar</a:t>
-            </a:r>
-            <a:r>
-              <a:rPr lang="en-US" dirty="0"/>
-              <a:t> geometry </a:t>
-            </a:r>
-            <a:r>
-              <a:rPr lang="en-US" dirty="0" err="1"/>
-              <a:t>cukup</a:t>
-            </a:r>
-            <a:r>
-              <a:rPr lang="en-US" dirty="0"/>
-              <a:t> </a:t>
-            </a:r>
-            <a:r>
-              <a:rPr lang="en-US" dirty="0" err="1"/>
-              <a:t>efektif</a:t>
-            </a:r>
-            <a:r>
-              <a:rPr lang="en-US" dirty="0"/>
-              <a:t> </a:t>
-            </a:r>
-            <a:r>
-              <a:rPr lang="en-US" dirty="0" err="1"/>
-              <a:t>untuk</a:t>
-            </a:r>
-            <a:r>
-              <a:rPr lang="en-US" dirty="0"/>
-              <a:t> </a:t>
-            </a:r>
-            <a:r>
-              <a:rPr lang="en-US" dirty="0" err="1"/>
-              <a:t>digunakan</a:t>
-            </a:r>
-            <a:r>
-              <a:rPr lang="en-US" dirty="0"/>
-              <a:t> </a:t>
-            </a:r>
-            <a:r>
-              <a:rPr lang="en-US" dirty="0" err="1"/>
-              <a:t>sebagai</a:t>
-            </a:r>
-            <a:r>
-              <a:rPr lang="en-US" dirty="0"/>
-              <a:t> </a:t>
-            </a:r>
-            <a:r>
-              <a:rPr lang="en-US" dirty="0" err="1"/>
-              <a:t>algoritma</a:t>
-            </a:r>
-            <a:r>
-              <a:rPr lang="en-US" dirty="0"/>
-              <a:t> </a:t>
-            </a:r>
-            <a:r>
-              <a:rPr lang="en-US" dirty="0" err="1"/>
-              <a:t>untuk</a:t>
-            </a:r>
-            <a:r>
-              <a:rPr lang="en-US" dirty="0"/>
-              <a:t> </a:t>
-            </a:r>
-            <a:r>
-              <a:rPr lang="en-US" dirty="0" err="1"/>
-              <a:t>mendeteksi</a:t>
-            </a:r>
-            <a:r>
-              <a:rPr lang="en-US" dirty="0"/>
-              <a:t> </a:t>
-            </a:r>
-            <a:r>
-              <a:rPr lang="en-US" dirty="0" err="1"/>
-              <a:t>obyek</a:t>
-            </a:r>
-            <a:r>
-              <a:rPr lang="en-US" dirty="0"/>
-              <a:t> </a:t>
-            </a:r>
-            <a:r>
-              <a:rPr lang="en-US" dirty="0" err="1"/>
-              <a:t>bergerak</a:t>
-            </a:r>
-            <a:r>
-              <a:rPr lang="en-US" dirty="0"/>
-              <a:t> di </a:t>
-            </a:r>
-            <a:r>
-              <a:rPr lang="en-US" dirty="0" err="1"/>
-              <a:t>ruang</a:t>
-            </a:r>
-            <a:r>
-              <a:rPr lang="en-US" dirty="0"/>
-              <a:t> </a:t>
-            </a:r>
-            <a:r>
-              <a:rPr lang="en-US" dirty="0" err="1"/>
-              <a:t>tiga</a:t>
-            </a:r>
-            <a:r>
-              <a:rPr lang="en-US" dirty="0"/>
-              <a:t> </a:t>
-            </a:r>
-            <a:r>
-              <a:rPr lang="en-US" dirty="0" err="1"/>
-              <a:t>dimensi</a:t>
-            </a:r>
-            <a:r>
-              <a:rPr lang="en-US" dirty="0"/>
-              <a:t>.</a:t>
-            </a:r>
-            <a:endParaRPr lang="id-ID" dirty="0"/>
-          </a:p>
-        </p:txBody>
-      </p:sp>
-    </p:spTree>
-    <p:extLst>
-      <p:ext uri="{BB962C8B-B14F-4D97-AF65-F5344CB8AC3E}">
-        <p14:creationId xmlns:p14="http://schemas.microsoft.com/office/powerpoint/2010/main" val="3844022892"/>
-      </p:ext>
-    </p:extLst>
-  </p:cSld>
-  <p:clrMapOvr>
-    <a:masterClrMapping/>
-  </p:clrMapOvr>
-  <p:timing>
-    <p:tnLst>
-      <p:par>
-        <p:cTn id="1" dur="indefinite" restart="never" nodeType="tmRoot"/>
-      </p:par>
-    </p:tnLst>
-  </p:timing>
-</p:sld>
-</file>
-
 <file path=ppt/slides/slide2.xml><?xml version="1.0" encoding="utf-8"?>
 <p:sld xmlns:a="http://schemas.openxmlformats.org/drawingml/2006/main" xmlns:r="http://schemas.openxmlformats.org/officeDocument/2006/relationships" xmlns:p="http://schemas.openxmlformats.org/presentationml/2006/main">
   <p:cSld>
@@ -17050,6 +17712,333 @@
     <p:extLst>
       <p:ext uri="{BB962C8B-B14F-4D97-AF65-F5344CB8AC3E}">
         <p14:creationId xmlns:p14="http://schemas.microsoft.com/office/powerpoint/2010/main" val="2754937371"/>
+      </p:ext>
+    </p:extLst>
+  </p:cSld>
+  <p:clrMapOvr>
+    <a:masterClrMapping/>
+  </p:clrMapOvr>
+  <p:timing>
+    <p:tnLst>
+      <p:par>
+        <p:cTn id="1" dur="indefinite" restart="never" nodeType="tmRoot"/>
+      </p:par>
+    </p:tnLst>
+  </p:timing>
+</p:sld>
+</file>
+
+<file path=ppt/slides/slide20.xml><?xml version="1.0" encoding="utf-8"?>
+<p:sld xmlns:a="http://schemas.openxmlformats.org/drawingml/2006/main" xmlns:r="http://schemas.openxmlformats.org/officeDocument/2006/relationships" xmlns:p="http://schemas.openxmlformats.org/presentationml/2006/main">
+  <p:cSld>
+    <p:spTree>
+      <p:nvGrpSpPr>
+        <p:cNvPr id="1" name=""/>
+        <p:cNvGrpSpPr/>
+        <p:nvPr/>
+      </p:nvGrpSpPr>
+      <p:grpSpPr>
+        <a:xfrm>
+          <a:off x="0" y="0"/>
+          <a:ext cx="0" cy="0"/>
+          <a:chOff x="0" y="0"/>
+          <a:chExt cx="0" cy="0"/>
+        </a:xfrm>
+      </p:grpSpPr>
+      <p:sp>
+        <p:nvSpPr>
+          <p:cNvPr id="2" name="Title 1"/>
+          <p:cNvSpPr>
+            <a:spLocks noGrp="1"/>
+          </p:cNvSpPr>
+          <p:nvPr>
+            <p:ph type="title"/>
+          </p:nvPr>
+        </p:nvSpPr>
+        <p:spPr/>
+        <p:txBody>
+          <a:bodyPr/>
+          <a:lstStyle/>
+          <a:p>
+            <a:pPr algn="r"/>
+            <a:r>
+              <a:rPr lang="id-ID" dirty="0" smtClean="0"/>
+              <a:t>kesimpulan</a:t>
+            </a:r>
+            <a:endParaRPr lang="id-ID" dirty="0"/>
+          </a:p>
+        </p:txBody>
+      </p:sp>
+      <p:sp>
+        <p:nvSpPr>
+          <p:cNvPr id="3" name="Content Placeholder 2"/>
+          <p:cNvSpPr>
+            <a:spLocks noGrp="1"/>
+          </p:cNvSpPr>
+          <p:nvPr>
+            <p:ph idx="1"/>
+          </p:nvPr>
+        </p:nvSpPr>
+        <p:spPr/>
+        <p:txBody>
+          <a:bodyPr/>
+          <a:lstStyle/>
+          <a:p>
+            <a:pPr lvl="0"/>
+            <a:r>
+              <a:rPr lang="id-ID" dirty="0"/>
+              <a:t>A</a:t>
+            </a:r>
+            <a:r>
+              <a:rPr lang="en-US" dirty="0" err="1"/>
+              <a:t>lat</a:t>
+            </a:r>
+            <a:r>
+              <a:rPr lang="id-ID" dirty="0"/>
+              <a:t>/sistem ini</a:t>
+            </a:r>
+            <a:r>
+              <a:rPr lang="en-US" dirty="0"/>
+              <a:t> </a:t>
+            </a:r>
+            <a:r>
+              <a:rPr lang="en-US" dirty="0" err="1"/>
+              <a:t>mampu</a:t>
+            </a:r>
+            <a:r>
+              <a:rPr lang="en-US" dirty="0"/>
+              <a:t> men</a:t>
+            </a:r>
+            <a:r>
+              <a:rPr lang="id-ID" dirty="0"/>
+              <a:t>deteksi posisi shuttle cock pada bidang tiga dimensi</a:t>
+            </a:r>
+            <a:r>
+              <a:rPr lang="en-US" dirty="0"/>
+              <a:t>.</a:t>
+            </a:r>
+            <a:endParaRPr lang="id-ID" dirty="0"/>
+          </a:p>
+          <a:p>
+            <a:pPr lvl="0"/>
+            <a:r>
+              <a:rPr lang="id-ID" dirty="0"/>
+              <a:t>Secara teoritis, tingkat reliabilitas</a:t>
+            </a:r>
+            <a:r>
+              <a:rPr lang="en-US" dirty="0"/>
+              <a:t> </a:t>
+            </a:r>
+            <a:r>
+              <a:rPr lang="en-US" dirty="0" err="1"/>
+              <a:t>dan</a:t>
+            </a:r>
+            <a:r>
+              <a:rPr lang="id-ID" dirty="0"/>
+              <a:t> tingkat</a:t>
+            </a:r>
+            <a:r>
+              <a:rPr lang="en-US" dirty="0"/>
+              <a:t> </a:t>
+            </a:r>
+            <a:r>
+              <a:rPr lang="en-US" dirty="0" err="1"/>
+              <a:t>keakuratan</a:t>
+            </a:r>
+            <a:r>
+              <a:rPr lang="en-US" dirty="0"/>
+              <a:t> </a:t>
+            </a:r>
+            <a:r>
+              <a:rPr lang="en-US" dirty="0" err="1"/>
+              <a:t>alat</a:t>
+            </a:r>
+            <a:r>
+              <a:rPr lang="id-ID" dirty="0"/>
+              <a:t>/sistem</a:t>
+            </a:r>
+            <a:r>
+              <a:rPr lang="en-US" dirty="0"/>
+              <a:t> yang </a:t>
+            </a:r>
+            <a:r>
+              <a:rPr lang="en-US" dirty="0" err="1"/>
+              <a:t>dibuat</a:t>
+            </a:r>
+            <a:r>
+              <a:rPr lang="id-ID" dirty="0"/>
+              <a:t> dalam mendeteksi posisi shuttle cock cukup baik.</a:t>
+            </a:r>
+          </a:p>
+          <a:p>
+            <a:r>
+              <a:rPr lang="en-US" dirty="0" err="1"/>
+              <a:t>Algoritma</a:t>
+            </a:r>
+            <a:r>
+              <a:rPr lang="en-US" dirty="0"/>
+              <a:t> </a:t>
+            </a:r>
+            <a:r>
+              <a:rPr lang="en-US" dirty="0" err="1"/>
+              <a:t>kombinasi</a:t>
+            </a:r>
+            <a:r>
+              <a:rPr lang="en-US" dirty="0"/>
+              <a:t> </a:t>
+            </a:r>
+            <a:r>
+              <a:rPr lang="en-US" dirty="0" err="1"/>
+              <a:t>dari</a:t>
+            </a:r>
+            <a:r>
+              <a:rPr lang="en-US" dirty="0"/>
+              <a:t> background </a:t>
+            </a:r>
+            <a:r>
+              <a:rPr lang="en-US" dirty="0" err="1"/>
+              <a:t>substraction</a:t>
+            </a:r>
+            <a:r>
+              <a:rPr lang="en-US" dirty="0"/>
+              <a:t>, optical flow, color </a:t>
+            </a:r>
+            <a:r>
+              <a:rPr lang="en-US" dirty="0" err="1"/>
+              <a:t>thresholding</a:t>
+            </a:r>
+            <a:r>
+              <a:rPr lang="en-US" dirty="0"/>
+              <a:t>, </a:t>
+            </a:r>
+            <a:r>
+              <a:rPr lang="en-US" dirty="0" err="1"/>
+              <a:t>dan</a:t>
+            </a:r>
+            <a:r>
+              <a:rPr lang="en-US" dirty="0"/>
+              <a:t> </a:t>
+            </a:r>
+            <a:r>
+              <a:rPr lang="en-US" dirty="0" err="1"/>
+              <a:t>epipolar</a:t>
+            </a:r>
+            <a:r>
+              <a:rPr lang="en-US" dirty="0"/>
+              <a:t> geometry </a:t>
+            </a:r>
+            <a:r>
+              <a:rPr lang="en-US" dirty="0" err="1"/>
+              <a:t>cukup</a:t>
+            </a:r>
+            <a:r>
+              <a:rPr lang="en-US" dirty="0"/>
+              <a:t> </a:t>
+            </a:r>
+            <a:r>
+              <a:rPr lang="en-US" dirty="0" err="1"/>
+              <a:t>efektif</a:t>
+            </a:r>
+            <a:r>
+              <a:rPr lang="en-US" dirty="0"/>
+              <a:t> </a:t>
+            </a:r>
+            <a:r>
+              <a:rPr lang="en-US" dirty="0" err="1"/>
+              <a:t>untuk</a:t>
+            </a:r>
+            <a:r>
+              <a:rPr lang="en-US" dirty="0"/>
+              <a:t> </a:t>
+            </a:r>
+            <a:r>
+              <a:rPr lang="en-US" dirty="0" err="1"/>
+              <a:t>digunakan</a:t>
+            </a:r>
+            <a:r>
+              <a:rPr lang="en-US" dirty="0"/>
+              <a:t> </a:t>
+            </a:r>
+            <a:r>
+              <a:rPr lang="en-US" dirty="0" err="1"/>
+              <a:t>sebagai</a:t>
+            </a:r>
+            <a:r>
+              <a:rPr lang="en-US" dirty="0"/>
+              <a:t> </a:t>
+            </a:r>
+            <a:r>
+              <a:rPr lang="en-US" dirty="0" err="1"/>
+              <a:t>algoritma</a:t>
+            </a:r>
+            <a:r>
+              <a:rPr lang="en-US" dirty="0"/>
+              <a:t> </a:t>
+            </a:r>
+            <a:r>
+              <a:rPr lang="en-US" dirty="0" err="1"/>
+              <a:t>untuk</a:t>
+            </a:r>
+            <a:r>
+              <a:rPr lang="en-US" dirty="0"/>
+              <a:t> </a:t>
+            </a:r>
+            <a:r>
+              <a:rPr lang="en-US" dirty="0" err="1"/>
+              <a:t>mendeteksi</a:t>
+            </a:r>
+            <a:r>
+              <a:rPr lang="en-US" dirty="0"/>
+              <a:t> </a:t>
+            </a:r>
+            <a:r>
+              <a:rPr lang="en-US" dirty="0" err="1"/>
+              <a:t>obyek</a:t>
+            </a:r>
+            <a:r>
+              <a:rPr lang="en-US" dirty="0"/>
+              <a:t> </a:t>
+            </a:r>
+            <a:r>
+              <a:rPr lang="en-US" dirty="0" err="1"/>
+              <a:t>bergerak</a:t>
+            </a:r>
+            <a:r>
+              <a:rPr lang="en-US" dirty="0"/>
+              <a:t> di </a:t>
+            </a:r>
+            <a:r>
+              <a:rPr lang="en-US" dirty="0" err="1"/>
+              <a:t>ruang</a:t>
+            </a:r>
+            <a:r>
+              <a:rPr lang="en-US" dirty="0"/>
+              <a:t> </a:t>
+            </a:r>
+            <a:r>
+              <a:rPr lang="en-US" dirty="0" err="1"/>
+              <a:t>tiga</a:t>
+            </a:r>
+            <a:r>
+              <a:rPr lang="en-US" dirty="0"/>
+              <a:t> </a:t>
+            </a:r>
+            <a:r>
+              <a:rPr lang="en-US" dirty="0" err="1"/>
+              <a:t>dimensi</a:t>
+            </a:r>
+            <a:r>
+              <a:rPr lang="en-US" dirty="0"/>
+              <a:t>.</a:t>
+            </a:r>
+            <a:endParaRPr lang="id-ID" dirty="0"/>
+          </a:p>
+        </p:txBody>
+      </p:sp>
+    </p:spTree>
+    <p:extLst>
+      <p:ext uri="{BB962C8B-B14F-4D97-AF65-F5344CB8AC3E}">
+        <p14:creationId xmlns:p14="http://schemas.microsoft.com/office/powerpoint/2010/main" val="3844022892"/>
       </p:ext>
     </p:extLst>
   </p:cSld>

</xml_diff>